<commit_message>
fitting of 3 params of VL sub-model
</commit_message>
<xml_diff>
--- a/docs/Calibration_validation_key_simulations.pptx
+++ b/docs/Calibration_validation_key_simulations.pptx
@@ -5,10 +5,10 @@
     <p:sldMasterId id="2147483660" r:id="rId1"/>
   </p:sldMasterIdLst>
   <p:notesMasterIdLst>
-    <p:notesMasterId r:id="rId21"/>
+    <p:notesMasterId r:id="rId28"/>
   </p:notesMasterIdLst>
   <p:handoutMasterIdLst>
-    <p:handoutMasterId r:id="rId22"/>
+    <p:handoutMasterId r:id="rId29"/>
   </p:handoutMasterIdLst>
   <p:sldIdLst>
     <p:sldId id="256" r:id="rId2"/>
@@ -27,9 +27,16 @@
     <p:sldId id="356" r:id="rId15"/>
     <p:sldId id="367" r:id="rId16"/>
     <p:sldId id="375" r:id="rId17"/>
-    <p:sldId id="315" r:id="rId18"/>
-    <p:sldId id="329" r:id="rId19"/>
-    <p:sldId id="376" r:id="rId20"/>
+    <p:sldId id="377" r:id="rId18"/>
+    <p:sldId id="386" r:id="rId19"/>
+    <p:sldId id="387" r:id="rId20"/>
+    <p:sldId id="388" r:id="rId21"/>
+    <p:sldId id="389" r:id="rId22"/>
+    <p:sldId id="315" r:id="rId23"/>
+    <p:sldId id="329" r:id="rId24"/>
+    <p:sldId id="376" r:id="rId25"/>
+    <p:sldId id="390" r:id="rId26"/>
+    <p:sldId id="391" r:id="rId27"/>
   </p:sldIdLst>
   <p:sldSz cx="9144000" cy="6858000" type="screen4x3"/>
   <p:notesSz cx="6858000" cy="9144000"/>
@@ -5254,7 +5261,7 @@
           <a:p>
             <a:fld id="{A94A04A9-86E8-4736-A88B-F0616A5CD8E2}" type="datetimeFigureOut">
               <a:rPr lang="ru-RU" smtClean="0"/>
-              <a:t>30-06-2020</a:t>
+              <a:t>19-07-2020</a:t>
             </a:fld>
             <a:endParaRPr lang="ru-RU"/>
           </a:p>
@@ -5431,7 +5438,7 @@
           <a:p>
             <a:fld id="{88DE18F7-3C35-4FFD-8CA4-BF84867EA133}" type="datetimeFigureOut">
               <a:rPr lang="ru-RU" smtClean="0"/>
-              <a:t>30-06-2020</a:t>
+              <a:t>19-07-2020</a:t>
             </a:fld>
             <a:endParaRPr lang="ru-RU"/>
           </a:p>
@@ -17102,10 +17109,145 @@
       </p:grpSpPr>
       <p:sp>
         <p:nvSpPr>
-          <p:cNvPr id="2" name="Slide Number Placeholder 1">
+          <p:cNvPr id="2" name="Title 1">
             <a:extLst>
               <a:ext uri="{FF2B5EF4-FFF2-40B4-BE49-F238E27FC236}">
-                <a16:creationId xmlns:a16="http://schemas.microsoft.com/office/drawing/2014/main" id="{AA6CEFC3-35E4-46AB-8178-6CE9EA81C1D9}"/>
+                <a16:creationId xmlns:a16="http://schemas.microsoft.com/office/drawing/2014/main" id="{06409FCD-A934-497E-8A5A-D566EBF17CDC}"/>
+              </a:ext>
+            </a:extLst>
+          </p:cNvPr>
+          <p:cNvSpPr>
+            <a:spLocks noGrp="1"/>
+          </p:cNvSpPr>
+          <p:nvPr>
+            <p:ph type="title"/>
+          </p:nvPr>
+        </p:nvSpPr>
+        <p:spPr/>
+        <p:txBody>
+          <a:bodyPr>
+            <a:normAutofit/>
+          </a:bodyPr>
+          <a:lstStyle/>
+          <a:p>
+            <a:r>
+              <a:rPr lang="en-US" sz="2800" dirty="0"/>
+              <a:t>Commit date: 20.07.12/20.07.19</a:t>
+            </a:r>
+            <a:br>
+              <a:rPr lang="en-US" sz="2800" dirty="0"/>
+            </a:br>
+            <a:br>
+              <a:rPr lang="en-US" sz="2800" dirty="0"/>
+            </a:br>
+            <a:r>
+              <a:rPr lang="en-US" sz="2800" dirty="0"/>
+              <a:t>Commit name: updated version (VL_v0.1.3) of SARS-CoV-2 viral dynamics model </a:t>
+            </a:r>
+            <a:endParaRPr lang="ru-RU" sz="2800" dirty="0"/>
+          </a:p>
+        </p:txBody>
+      </p:sp>
+      <p:sp>
+        <p:nvSpPr>
+          <p:cNvPr id="3" name="Text Placeholder 2">
+            <a:extLst>
+              <a:ext uri="{FF2B5EF4-FFF2-40B4-BE49-F238E27FC236}">
+                <a16:creationId xmlns:a16="http://schemas.microsoft.com/office/drawing/2014/main" id="{C33FC260-48D1-4607-9B82-D2CD2E577DB2}"/>
+              </a:ext>
+            </a:extLst>
+          </p:cNvPr>
+          <p:cNvSpPr>
+            <a:spLocks noGrp="1"/>
+          </p:cNvSpPr>
+          <p:nvPr>
+            <p:ph type="body" idx="1"/>
+          </p:nvPr>
+        </p:nvSpPr>
+        <p:spPr>
+          <a:xfrm>
+            <a:off x="623888" y="3962931"/>
+            <a:ext cx="7886700" cy="2302402"/>
+          </a:xfrm>
+        </p:spPr>
+        <p:txBody>
+          <a:bodyPr>
+            <a:normAutofit/>
+          </a:bodyPr>
+          <a:lstStyle/>
+          <a:p>
+            <a:r>
+              <a:rPr lang="en-US" sz="1400" dirty="0"/>
+              <a:t>Aims: </a:t>
+            </a:r>
+          </a:p>
+          <a:p>
+            <a:pPr marL="342900" indent="-342900">
+              <a:buFont typeface="Arial" panose="020B0604020202020204" pitchFamily="34" charset="0"/>
+              <a:buChar char="•"/>
+            </a:pPr>
+            <a:r>
+              <a:rPr lang="en-US" sz="1400" dirty="0"/>
+              <a:t>To correct errors in units</a:t>
+            </a:r>
+          </a:p>
+          <a:p>
+            <a:pPr marL="342900" indent="-342900">
+              <a:buFont typeface="Arial" panose="020B0604020202020204" pitchFamily="34" charset="0"/>
+              <a:buChar char="•"/>
+            </a:pPr>
+            <a:r>
+              <a:rPr lang="en-US" sz="1400" dirty="0"/>
+              <a:t>To change expressions for Emax like functions in order to avoid exponentiation of</a:t>
+            </a:r>
+            <a:r>
+              <a:rPr lang="ru-RU" sz="1400" dirty="0"/>
+              <a:t> </a:t>
+            </a:r>
+            <a:r>
+              <a:rPr lang="en-US" sz="1400" dirty="0"/>
+              <a:t>dimensional variables </a:t>
+            </a:r>
+          </a:p>
+          <a:p>
+            <a:pPr marL="342900" indent="-342900">
+              <a:buFont typeface="Arial" panose="020B0604020202020204" pitchFamily="34" charset="0"/>
+              <a:buChar char="•"/>
+            </a:pPr>
+            <a:r>
+              <a:rPr lang="en-US" sz="1400" dirty="0"/>
+              <a:t>To correct error in readout function describing number of virus copies in 1 mL of sputum</a:t>
+            </a:r>
+          </a:p>
+          <a:p>
+            <a:pPr marL="342900" indent="-342900">
+              <a:buFont typeface="Arial" panose="020B0604020202020204" pitchFamily="34" charset="0"/>
+              <a:buChar char="•"/>
+            </a:pPr>
+            <a:r>
+              <a:rPr lang="en-US" sz="1400" dirty="0"/>
+              <a:t>To refit  experimental data describing clinically measured viral  load dynamics in sputum</a:t>
+            </a:r>
+          </a:p>
+          <a:p>
+            <a:pPr marL="342900" indent="-342900">
+              <a:buFont typeface="Arial" panose="020B0604020202020204" pitchFamily="34" charset="0"/>
+              <a:buChar char="•"/>
+            </a:pPr>
+            <a:r>
+              <a:rPr lang="en-US" sz="1400" dirty="0"/>
+              <a:t>To perform key simulations with the updated model</a:t>
+            </a:r>
+            <a:endParaRPr lang="ru-RU" sz="1400" dirty="0"/>
+          </a:p>
+        </p:txBody>
+      </p:sp>
+      <p:sp>
+        <p:nvSpPr>
+          <p:cNvPr id="4" name="Slide Number Placeholder 3">
+            <a:extLst>
+              <a:ext uri="{FF2B5EF4-FFF2-40B4-BE49-F238E27FC236}">
+                <a16:creationId xmlns:a16="http://schemas.microsoft.com/office/drawing/2014/main" id="{B5E3C9EE-DEA7-4EF1-8145-1DF3D9BCBA61}"/>
               </a:ext>
             </a:extLst>
           </p:cNvPr>
@@ -17133,6 +17275,2862 @@
     </p:spTree>
     <p:extLst>
       <p:ext uri="{BB962C8B-B14F-4D97-AF65-F5344CB8AC3E}">
+        <p14:creationId xmlns:p14="http://schemas.microsoft.com/office/powerpoint/2010/main" val="2459582478"/>
+      </p:ext>
+    </p:extLst>
+  </p:cSld>
+  <p:clrMapOvr>
+    <a:masterClrMapping/>
+  </p:clrMapOvr>
+</p:sld>
+</file>
+
+<file path=ppt/slides/slide18.xml><?xml version="1.0" encoding="utf-8"?>
+<p:sld xmlns:a="http://schemas.openxmlformats.org/drawingml/2006/main" xmlns:r="http://schemas.openxmlformats.org/officeDocument/2006/relationships" xmlns:p="http://schemas.openxmlformats.org/presentationml/2006/main">
+  <p:cSld>
+    <p:spTree>
+      <p:nvGrpSpPr>
+        <p:cNvPr id="1" name=""/>
+        <p:cNvGrpSpPr/>
+        <p:nvPr/>
+      </p:nvGrpSpPr>
+      <p:grpSpPr>
+        <a:xfrm>
+          <a:off x="0" y="0"/>
+          <a:ext cx="0" cy="0"/>
+          <a:chOff x="0" y="0"/>
+          <a:chExt cx="0" cy="0"/>
+        </a:xfrm>
+      </p:grpSpPr>
+      <p:sp>
+        <p:nvSpPr>
+          <p:cNvPr id="2" name="Title 1">
+            <a:extLst>
+              <a:ext uri="{FF2B5EF4-FFF2-40B4-BE49-F238E27FC236}">
+                <a16:creationId xmlns:a16="http://schemas.microsoft.com/office/drawing/2014/main" id="{DB1F0EDD-A17D-4CBE-9ABF-547DC9B5BF70}"/>
+              </a:ext>
+            </a:extLst>
+          </p:cNvPr>
+          <p:cNvSpPr>
+            <a:spLocks noGrp="1"/>
+          </p:cNvSpPr>
+          <p:nvPr>
+            <p:ph type="title"/>
+          </p:nvPr>
+        </p:nvSpPr>
+        <p:spPr/>
+        <p:txBody>
+          <a:bodyPr>
+            <a:noAutofit/>
+          </a:bodyPr>
+          <a:lstStyle/>
+          <a:p>
+            <a:r>
+              <a:rPr lang="en-US" sz="2400" dirty="0"/>
+              <a:t>Reproduction of clinical data on viral load dynamics</a:t>
+            </a:r>
+            <a:endParaRPr lang="ru-RU" sz="2400" dirty="0"/>
+          </a:p>
+        </p:txBody>
+      </p:sp>
+      <p:sp>
+        <p:nvSpPr>
+          <p:cNvPr id="3" name="Slide Number Placeholder 2">
+            <a:extLst>
+              <a:ext uri="{FF2B5EF4-FFF2-40B4-BE49-F238E27FC236}">
+                <a16:creationId xmlns:a16="http://schemas.microsoft.com/office/drawing/2014/main" id="{B024B872-507A-4C79-B75E-90137F5363F8}"/>
+              </a:ext>
+            </a:extLst>
+          </p:cNvPr>
+          <p:cNvSpPr>
+            <a:spLocks noGrp="1"/>
+          </p:cNvSpPr>
+          <p:nvPr>
+            <p:ph type="sldNum" sz="quarter" idx="12"/>
+          </p:nvPr>
+        </p:nvSpPr>
+        <p:spPr/>
+        <p:txBody>
+          <a:bodyPr/>
+          <a:lstStyle/>
+          <a:p>
+            <a:fld id="{8D0E1ED9-1B5C-4060-9004-48CB920062D4}" type="slidenum">
+              <a:rPr lang="ru-RU" smtClean="0"/>
+              <a:pPr/>
+              <a:t>18</a:t>
+            </a:fld>
+            <a:endParaRPr lang="ru-RU"/>
+          </a:p>
+        </p:txBody>
+      </p:sp>
+      <p:sp>
+        <p:nvSpPr>
+          <p:cNvPr id="17" name="TextBox 16">
+            <a:extLst>
+              <a:ext uri="{FF2B5EF4-FFF2-40B4-BE49-F238E27FC236}">
+                <a16:creationId xmlns:a16="http://schemas.microsoft.com/office/drawing/2014/main" id="{8575FB8D-B80A-4D7F-8A53-C2DCB2525375}"/>
+              </a:ext>
+            </a:extLst>
+          </p:cNvPr>
+          <p:cNvSpPr txBox="1"/>
+          <p:nvPr/>
+        </p:nvSpPr>
+        <p:spPr>
+          <a:xfrm>
+            <a:off x="4838700" y="766233"/>
+            <a:ext cx="4191437" cy="3170099"/>
+          </a:xfrm>
+          <a:prstGeom prst="rect">
+            <a:avLst/>
+          </a:prstGeom>
+          <a:noFill/>
+        </p:spPr>
+        <p:txBody>
+          <a:bodyPr wrap="square" rtlCol="0">
+            <a:spAutoFit/>
+          </a:bodyPr>
+          <a:lstStyle/>
+          <a:p>
+            <a:pPr marL="285750" indent="-285750">
+              <a:buFont typeface="Arial" panose="020B0604020202020204" pitchFamily="34" charset="0"/>
+              <a:buChar char="•"/>
+            </a:pPr>
+            <a:r>
+              <a:rPr lang="en-US" sz="1600" dirty="0"/>
+              <a:t>Viral load and % of viral </a:t>
+            </a:r>
+            <a:r>
+              <a:rPr lang="en-US" sz="1600" dirty="0" err="1"/>
+              <a:t>subgenomic</a:t>
+            </a:r>
+            <a:r>
+              <a:rPr lang="en-US" sz="1600" dirty="0"/>
+              <a:t> mRNA in sputum were simulated </a:t>
+            </a:r>
+          </a:p>
+          <a:p>
+            <a:pPr marL="285750" indent="-285750">
+              <a:buFont typeface="Arial" panose="020B0604020202020204" pitchFamily="34" charset="0"/>
+              <a:buChar char="•"/>
+            </a:pPr>
+            <a:r>
+              <a:rPr lang="en-US" sz="1600" dirty="0"/>
+              <a:t>Following </a:t>
+            </a:r>
+            <a:r>
+              <a:rPr lang="en-US" sz="1600" b="1" dirty="0">
+                <a:solidFill>
+                  <a:srgbClr val="C00000"/>
+                </a:solidFill>
+              </a:rPr>
+              <a:t>3</a:t>
+            </a:r>
+            <a:r>
+              <a:rPr lang="en-US" sz="1600" dirty="0"/>
+              <a:t> parameters were refitted: </a:t>
+            </a:r>
+          </a:p>
+          <a:p>
+            <a:r>
+              <a:rPr lang="en-US" sz="1200" dirty="0" err="1"/>
+              <a:t>kbase_tran_pc_ipc</a:t>
+            </a:r>
+            <a:r>
+              <a:rPr lang="en-US" sz="1200" dirty="0"/>
+              <a:t> = 10;//</a:t>
+            </a:r>
+            <a:r>
+              <a:rPr lang="en-US" sz="1200" strike="sngStrike" dirty="0">
+                <a:solidFill>
+                  <a:srgbClr val="FF0000"/>
+                </a:solidFill>
+              </a:rPr>
+              <a:t>0.25</a:t>
+            </a:r>
+            <a:r>
+              <a:rPr lang="en-US" sz="1200" dirty="0"/>
+              <a:t>; // {units: 1/</a:t>
+            </a:r>
+            <a:r>
+              <a:rPr lang="en-US" sz="1200" dirty="0" err="1"/>
+              <a:t>pmole</a:t>
+            </a:r>
+            <a:r>
+              <a:rPr lang="en-US" sz="1200" dirty="0"/>
+              <a:t>/h};</a:t>
+            </a:r>
+          </a:p>
+          <a:p>
+            <a:r>
+              <a:rPr lang="en-US" sz="1200" dirty="0" err="1"/>
+              <a:t>kbase_tran_ipc_vpc</a:t>
+            </a:r>
+            <a:r>
+              <a:rPr lang="en-US" sz="1200" dirty="0"/>
+              <a:t> = 10;//</a:t>
+            </a:r>
+            <a:r>
+              <a:rPr lang="en-US" sz="1200" strike="sngStrike" dirty="0">
+                <a:solidFill>
+                  <a:srgbClr val="FF0000"/>
+                </a:solidFill>
+              </a:rPr>
+              <a:t>0.25</a:t>
+            </a:r>
+            <a:r>
+              <a:rPr lang="en-US" sz="1200" dirty="0"/>
+              <a:t>; // {units: 1/</a:t>
+            </a:r>
+            <a:r>
+              <a:rPr lang="en-US" sz="1200" dirty="0" err="1"/>
+              <a:t>pmole</a:t>
+            </a:r>
+            <a:r>
+              <a:rPr lang="en-US" sz="1200" dirty="0"/>
+              <a:t>/h};</a:t>
+            </a:r>
+          </a:p>
+          <a:p>
+            <a:r>
+              <a:rPr lang="en-US" sz="1200" dirty="0" err="1"/>
+              <a:t>k_rep_cov_rna_vpc</a:t>
+            </a:r>
+            <a:r>
+              <a:rPr lang="en-US" sz="1200" dirty="0"/>
+              <a:t> = 0.2;//</a:t>
+            </a:r>
+            <a:r>
+              <a:rPr lang="en-US" sz="1200" strike="sngStrike" dirty="0">
+                <a:solidFill>
+                  <a:srgbClr val="FF0000"/>
+                </a:solidFill>
+              </a:rPr>
+              <a:t>0.5</a:t>
+            </a:r>
+            <a:r>
+              <a:rPr lang="en-US" sz="1200" dirty="0"/>
+              <a:t>; // {units: 1/h};</a:t>
+            </a:r>
+          </a:p>
+          <a:p>
+            <a:endParaRPr lang="en-US" sz="1600" dirty="0"/>
+          </a:p>
+          <a:p>
+            <a:pPr marL="285750" indent="-285750">
+              <a:buFont typeface="Arial" panose="020B0604020202020204" pitchFamily="34" charset="0"/>
+              <a:buChar char="•"/>
+            </a:pPr>
+            <a:r>
+              <a:rPr lang="en-US" sz="1600" dirty="0"/>
+              <a:t>COV initial values in alveolar surfactant and their correspondence to viral concentration in sputum: </a:t>
+            </a:r>
+          </a:p>
+          <a:p>
+            <a:r>
+              <a:rPr lang="en-US" sz="1200" dirty="0"/>
+              <a:t>COV(0) = 1.7e-3 </a:t>
+            </a:r>
+            <a:r>
+              <a:rPr lang="en-US" sz="1200" dirty="0" err="1"/>
+              <a:t>pM</a:t>
+            </a:r>
+            <a:r>
+              <a:rPr lang="en-US" sz="1200" dirty="0"/>
+              <a:t> </a:t>
+            </a:r>
+            <a:r>
+              <a:rPr lang="en-US" sz="1200" dirty="0">
+                <a:sym typeface="Wingdings" panose="05000000000000000000" pitchFamily="2" charset="2"/>
+              </a:rPr>
+              <a:t> 1e5 copies/mL</a:t>
+            </a:r>
+          </a:p>
+          <a:p>
+            <a:r>
+              <a:rPr lang="en-US" sz="1200" dirty="0"/>
+              <a:t>COV(0) = 2e-3 </a:t>
+            </a:r>
+            <a:r>
+              <a:rPr lang="en-US" sz="1200" dirty="0" err="1"/>
+              <a:t>pM</a:t>
+            </a:r>
+            <a:r>
+              <a:rPr lang="en-US" sz="1200" dirty="0"/>
+              <a:t> </a:t>
+            </a:r>
+            <a:r>
+              <a:rPr lang="en-US" sz="1200" dirty="0">
+                <a:sym typeface="Wingdings" panose="05000000000000000000" pitchFamily="2" charset="2"/>
+              </a:rPr>
+              <a:t> 1.2e5 copies/mL</a:t>
+            </a:r>
+          </a:p>
+          <a:p>
+            <a:r>
+              <a:rPr lang="en-US" sz="1200" dirty="0"/>
+              <a:t>COV(0) = 2.5e-3 </a:t>
+            </a:r>
+            <a:r>
+              <a:rPr lang="en-US" sz="1200" dirty="0" err="1"/>
+              <a:t>pM</a:t>
+            </a:r>
+            <a:r>
+              <a:rPr lang="en-US" sz="1200" dirty="0"/>
+              <a:t> </a:t>
+            </a:r>
+            <a:r>
+              <a:rPr lang="en-US" sz="1200" dirty="0">
+                <a:sym typeface="Wingdings" panose="05000000000000000000" pitchFamily="2" charset="2"/>
+              </a:rPr>
+              <a:t> 1.5e5 copies/mL</a:t>
+            </a:r>
+            <a:endParaRPr lang="en-US" sz="1200" dirty="0"/>
+          </a:p>
+          <a:p>
+            <a:pPr marL="285750" indent="-285750">
+              <a:buFont typeface="Arial" panose="020B0604020202020204" pitchFamily="34" charset="0"/>
+              <a:buChar char="•"/>
+            </a:pPr>
+            <a:endParaRPr lang="ru-RU" sz="1600" dirty="0"/>
+          </a:p>
+        </p:txBody>
+      </p:sp>
+      <p:grpSp>
+        <p:nvGrpSpPr>
+          <p:cNvPr id="14" name="Group 13">
+            <a:extLst>
+              <a:ext uri="{FF2B5EF4-FFF2-40B4-BE49-F238E27FC236}">
+                <a16:creationId xmlns:a16="http://schemas.microsoft.com/office/drawing/2014/main" id="{82128D77-B277-4D47-8CA6-13F0A5D6D3EC}"/>
+              </a:ext>
+            </a:extLst>
+          </p:cNvPr>
+          <p:cNvGrpSpPr/>
+          <p:nvPr/>
+        </p:nvGrpSpPr>
+        <p:grpSpPr>
+          <a:xfrm>
+            <a:off x="139773" y="819149"/>
+            <a:ext cx="4539675" cy="2643347"/>
+            <a:chOff x="139773" y="819149"/>
+            <a:chExt cx="4539675" cy="2643347"/>
+          </a:xfrm>
+        </p:grpSpPr>
+        <p:pic>
+          <p:nvPicPr>
+            <p:cNvPr id="8" name="Picture 7">
+              <a:extLst>
+                <a:ext uri="{FF2B5EF4-FFF2-40B4-BE49-F238E27FC236}">
+                  <a16:creationId xmlns:a16="http://schemas.microsoft.com/office/drawing/2014/main" id="{586BFEF8-75A4-4D48-B273-2561AE2DCD85}"/>
+                </a:ext>
+              </a:extLst>
+            </p:cNvPr>
+            <p:cNvPicPr>
+              <a:picLocks noChangeAspect="1"/>
+            </p:cNvPicPr>
+            <p:nvPr/>
+          </p:nvPicPr>
+          <p:blipFill>
+            <a:blip r:embed="rId2">
+              <a:extLst>
+                <a:ext uri="{28A0092B-C50C-407E-A947-70E740481C1C}">
+                  <a14:useLocalDpi xmlns:a14="http://schemas.microsoft.com/office/drawing/2010/main" val="0"/>
+                </a:ext>
+              </a:extLst>
+            </a:blip>
+            <a:stretch>
+              <a:fillRect/>
+            </a:stretch>
+          </p:blipFill>
+          <p:spPr>
+            <a:xfrm>
+              <a:off x="139773" y="819149"/>
+              <a:ext cx="4539675" cy="2643347"/>
+            </a:xfrm>
+            <a:prstGeom prst="rect">
+              <a:avLst/>
+            </a:prstGeom>
+          </p:spPr>
+        </p:pic>
+        <p:sp>
+          <p:nvSpPr>
+            <p:cNvPr id="20" name="TextBox 19">
+              <a:extLst>
+                <a:ext uri="{FF2B5EF4-FFF2-40B4-BE49-F238E27FC236}">
+                  <a16:creationId xmlns:a16="http://schemas.microsoft.com/office/drawing/2014/main" id="{A0C10E94-7E3A-44CE-84AB-3C8F05A0AC83}"/>
+                </a:ext>
+              </a:extLst>
+            </p:cNvPr>
+            <p:cNvSpPr txBox="1"/>
+            <p:nvPr/>
+          </p:nvSpPr>
+          <p:spPr>
+            <a:xfrm>
+              <a:off x="2745318" y="1006802"/>
+              <a:ext cx="1845732" cy="861774"/>
+            </a:xfrm>
+            <a:prstGeom prst="rect">
+              <a:avLst/>
+            </a:prstGeom>
+            <a:noFill/>
+          </p:spPr>
+          <p:txBody>
+            <a:bodyPr wrap="square" rtlCol="0">
+              <a:spAutoFit/>
+            </a:bodyPr>
+            <a:lstStyle/>
+            <a:p>
+              <a:r>
+                <a:rPr lang="en-US" sz="1000" dirty="0"/>
+                <a:t>Wolfer et al, doi.org/10.1101/</a:t>
+              </a:r>
+            </a:p>
+            <a:p>
+              <a:r>
+                <a:rPr lang="en-US" sz="1000" dirty="0"/>
+                <a:t>2020.03.05.20030502</a:t>
+              </a:r>
+            </a:p>
+            <a:p>
+              <a:r>
+                <a:rPr lang="en-US" sz="1000" dirty="0">
+                  <a:solidFill>
+                    <a:srgbClr val="0000FF"/>
+                  </a:solidFill>
+                </a:rPr>
+                <a:t>Time/value of peak viral load and range of viral shedding [PMID 32315724]</a:t>
+              </a:r>
+              <a:endParaRPr lang="ru-RU" sz="1000" dirty="0">
+                <a:solidFill>
+                  <a:srgbClr val="0000FF"/>
+                </a:solidFill>
+              </a:endParaRPr>
+            </a:p>
+          </p:txBody>
+        </p:sp>
+        <p:sp>
+          <p:nvSpPr>
+            <p:cNvPr id="18" name="TextBox 17">
+              <a:extLst>
+                <a:ext uri="{FF2B5EF4-FFF2-40B4-BE49-F238E27FC236}">
+                  <a16:creationId xmlns:a16="http://schemas.microsoft.com/office/drawing/2014/main" id="{B5E1180F-2648-40DC-A508-D49C10E01891}"/>
+                </a:ext>
+              </a:extLst>
+            </p:cNvPr>
+            <p:cNvSpPr txBox="1"/>
+            <p:nvPr/>
+          </p:nvSpPr>
+          <p:spPr>
+            <a:xfrm>
+              <a:off x="1536469" y="2293182"/>
+              <a:ext cx="1217993" cy="707886"/>
+            </a:xfrm>
+            <a:prstGeom prst="rect">
+              <a:avLst/>
+            </a:prstGeom>
+            <a:noFill/>
+          </p:spPr>
+          <p:txBody>
+            <a:bodyPr wrap="square" rtlCol="0">
+              <a:spAutoFit/>
+            </a:bodyPr>
+            <a:lstStyle/>
+            <a:p>
+              <a:r>
+                <a:rPr lang="en-US" sz="1000" b="1" dirty="0"/>
+                <a:t>Virus initial concentration: 1.2e5 copies/mL</a:t>
+              </a:r>
+            </a:p>
+            <a:p>
+              <a:r>
+                <a:rPr lang="en-US" sz="1000" b="1" dirty="0">
+                  <a:solidFill>
+                    <a:srgbClr val="0000FF"/>
+                  </a:solidFill>
+                </a:rPr>
+                <a:t>1.5e5 copies/mL</a:t>
+              </a:r>
+              <a:endParaRPr lang="ru-RU" sz="1000" b="1" dirty="0">
+                <a:solidFill>
+                  <a:srgbClr val="0000FF"/>
+                </a:solidFill>
+              </a:endParaRPr>
+            </a:p>
+          </p:txBody>
+        </p:sp>
+      </p:grpSp>
+      <p:grpSp>
+        <p:nvGrpSpPr>
+          <p:cNvPr id="25" name="Group 24">
+            <a:extLst>
+              <a:ext uri="{FF2B5EF4-FFF2-40B4-BE49-F238E27FC236}">
+                <a16:creationId xmlns:a16="http://schemas.microsoft.com/office/drawing/2014/main" id="{3F2A221A-D552-4C70-AB6E-34B30E3E181A}"/>
+              </a:ext>
+            </a:extLst>
+          </p:cNvPr>
+          <p:cNvGrpSpPr/>
+          <p:nvPr/>
+        </p:nvGrpSpPr>
+        <p:grpSpPr>
+          <a:xfrm>
+            <a:off x="4682060" y="3756515"/>
+            <a:ext cx="4348078" cy="2736176"/>
+            <a:chOff x="4682060" y="3756515"/>
+            <a:chExt cx="4348078" cy="2736176"/>
+          </a:xfrm>
+        </p:grpSpPr>
+        <p:pic>
+          <p:nvPicPr>
+            <p:cNvPr id="12" name="Picture 11">
+              <a:extLst>
+                <a:ext uri="{FF2B5EF4-FFF2-40B4-BE49-F238E27FC236}">
+                  <a16:creationId xmlns:a16="http://schemas.microsoft.com/office/drawing/2014/main" id="{43DE440A-B917-46F9-BF5D-B9447479135E}"/>
+                </a:ext>
+              </a:extLst>
+            </p:cNvPr>
+            <p:cNvPicPr>
+              <a:picLocks noChangeAspect="1"/>
+            </p:cNvPicPr>
+            <p:nvPr/>
+          </p:nvPicPr>
+          <p:blipFill>
+            <a:blip r:embed="rId3">
+              <a:extLst>
+                <a:ext uri="{28A0092B-C50C-407E-A947-70E740481C1C}">
+                  <a14:useLocalDpi xmlns:a14="http://schemas.microsoft.com/office/drawing/2010/main" val="0"/>
+                </a:ext>
+              </a:extLst>
+            </a:blip>
+            <a:stretch>
+              <a:fillRect/>
+            </a:stretch>
+          </p:blipFill>
+          <p:spPr>
+            <a:xfrm>
+              <a:off x="4682060" y="3756515"/>
+              <a:ext cx="4348078" cy="2736176"/>
+            </a:xfrm>
+            <a:prstGeom prst="rect">
+              <a:avLst/>
+            </a:prstGeom>
+          </p:spPr>
+        </p:pic>
+        <p:sp>
+          <p:nvSpPr>
+            <p:cNvPr id="16" name="TextBox 15">
+              <a:extLst>
+                <a:ext uri="{FF2B5EF4-FFF2-40B4-BE49-F238E27FC236}">
+                  <a16:creationId xmlns:a16="http://schemas.microsoft.com/office/drawing/2014/main" id="{1E7F88A8-60C5-4FEA-B8F2-94F337325FC0}"/>
+                </a:ext>
+              </a:extLst>
+            </p:cNvPr>
+            <p:cNvSpPr txBox="1"/>
+            <p:nvPr/>
+          </p:nvSpPr>
+          <p:spPr>
+            <a:xfrm>
+              <a:off x="5218502" y="4020685"/>
+              <a:ext cx="1845732" cy="400110"/>
+            </a:xfrm>
+            <a:prstGeom prst="rect">
+              <a:avLst/>
+            </a:prstGeom>
+            <a:noFill/>
+          </p:spPr>
+          <p:txBody>
+            <a:bodyPr wrap="square" rtlCol="0">
+              <a:spAutoFit/>
+            </a:bodyPr>
+            <a:lstStyle/>
+            <a:p>
+              <a:r>
+                <a:rPr lang="en-US" sz="1000" dirty="0"/>
+                <a:t>Wolfer et al, doi.org/10.1101/</a:t>
+              </a:r>
+            </a:p>
+            <a:p>
+              <a:r>
+                <a:rPr lang="en-US" sz="1000" dirty="0"/>
+                <a:t>2020.03.05.20030502</a:t>
+              </a:r>
+            </a:p>
+          </p:txBody>
+        </p:sp>
+        <p:sp>
+          <p:nvSpPr>
+            <p:cNvPr id="23" name="TextBox 22">
+              <a:extLst>
+                <a:ext uri="{FF2B5EF4-FFF2-40B4-BE49-F238E27FC236}">
+                  <a16:creationId xmlns:a16="http://schemas.microsoft.com/office/drawing/2014/main" id="{60EEA6A1-DC0E-4B18-99BA-95F1A38AB271}"/>
+                </a:ext>
+              </a:extLst>
+            </p:cNvPr>
+            <p:cNvSpPr txBox="1"/>
+            <p:nvPr/>
+          </p:nvSpPr>
+          <p:spPr>
+            <a:xfrm>
+              <a:off x="5846241" y="5311119"/>
+              <a:ext cx="1217993" cy="707886"/>
+            </a:xfrm>
+            <a:prstGeom prst="rect">
+              <a:avLst/>
+            </a:prstGeom>
+            <a:noFill/>
+          </p:spPr>
+          <p:txBody>
+            <a:bodyPr wrap="square" rtlCol="0">
+              <a:spAutoFit/>
+            </a:bodyPr>
+            <a:lstStyle/>
+            <a:p>
+              <a:r>
+                <a:rPr lang="en-US" sz="1000" b="1" dirty="0"/>
+                <a:t>Virus initial concentration: 1.2e5 copies/mL</a:t>
+              </a:r>
+            </a:p>
+            <a:p>
+              <a:r>
+                <a:rPr lang="en-US" sz="1000" b="1" dirty="0">
+                  <a:solidFill>
+                    <a:srgbClr val="0000FF"/>
+                  </a:solidFill>
+                </a:rPr>
+                <a:t>1.5e5 copies/mL</a:t>
+              </a:r>
+              <a:endParaRPr lang="ru-RU" sz="1000" b="1" dirty="0">
+                <a:solidFill>
+                  <a:srgbClr val="0000FF"/>
+                </a:solidFill>
+              </a:endParaRPr>
+            </a:p>
+          </p:txBody>
+        </p:sp>
+      </p:grpSp>
+      <p:grpSp>
+        <p:nvGrpSpPr>
+          <p:cNvPr id="24" name="Group 23">
+            <a:extLst>
+              <a:ext uri="{FF2B5EF4-FFF2-40B4-BE49-F238E27FC236}">
+                <a16:creationId xmlns:a16="http://schemas.microsoft.com/office/drawing/2014/main" id="{EE6F5CBD-4370-4B8C-8A5F-FA63A20945F9}"/>
+              </a:ext>
+            </a:extLst>
+          </p:cNvPr>
+          <p:cNvGrpSpPr/>
+          <p:nvPr/>
+        </p:nvGrpSpPr>
+        <p:grpSpPr>
+          <a:xfrm>
+            <a:off x="139774" y="3756515"/>
+            <a:ext cx="4538712" cy="2736176"/>
+            <a:chOff x="139774" y="3756515"/>
+            <a:chExt cx="4538712" cy="2736176"/>
+          </a:xfrm>
+        </p:grpSpPr>
+        <p:pic>
+          <p:nvPicPr>
+            <p:cNvPr id="10" name="Picture 9">
+              <a:extLst>
+                <a:ext uri="{FF2B5EF4-FFF2-40B4-BE49-F238E27FC236}">
+                  <a16:creationId xmlns:a16="http://schemas.microsoft.com/office/drawing/2014/main" id="{5FB11FDE-B5F3-4E6D-99AA-3A002F89C1C7}"/>
+                </a:ext>
+              </a:extLst>
+            </p:cNvPr>
+            <p:cNvPicPr>
+              <a:picLocks noChangeAspect="1"/>
+            </p:cNvPicPr>
+            <p:nvPr/>
+          </p:nvPicPr>
+          <p:blipFill>
+            <a:blip r:embed="rId4">
+              <a:extLst>
+                <a:ext uri="{28A0092B-C50C-407E-A947-70E740481C1C}">
+                  <a14:useLocalDpi xmlns:a14="http://schemas.microsoft.com/office/drawing/2010/main" val="0"/>
+                </a:ext>
+              </a:extLst>
+            </a:blip>
+            <a:stretch>
+              <a:fillRect/>
+            </a:stretch>
+          </p:blipFill>
+          <p:spPr>
+            <a:xfrm>
+              <a:off x="139774" y="3756515"/>
+              <a:ext cx="4538712" cy="2736176"/>
+            </a:xfrm>
+            <a:prstGeom prst="rect">
+              <a:avLst/>
+            </a:prstGeom>
+          </p:spPr>
+        </p:pic>
+        <p:sp>
+          <p:nvSpPr>
+            <p:cNvPr id="22" name="TextBox 21">
+              <a:extLst>
+                <a:ext uri="{FF2B5EF4-FFF2-40B4-BE49-F238E27FC236}">
+                  <a16:creationId xmlns:a16="http://schemas.microsoft.com/office/drawing/2014/main" id="{D8947261-01AC-4904-ACA0-B7919C94086C}"/>
+                </a:ext>
+              </a:extLst>
+            </p:cNvPr>
+            <p:cNvSpPr txBox="1"/>
+            <p:nvPr/>
+          </p:nvSpPr>
+          <p:spPr>
+            <a:xfrm>
+              <a:off x="1517419" y="5465007"/>
+              <a:ext cx="1217993" cy="553998"/>
+            </a:xfrm>
+            <a:prstGeom prst="rect">
+              <a:avLst/>
+            </a:prstGeom>
+            <a:noFill/>
+          </p:spPr>
+          <p:txBody>
+            <a:bodyPr wrap="square" rtlCol="0">
+              <a:spAutoFit/>
+            </a:bodyPr>
+            <a:lstStyle/>
+            <a:p>
+              <a:r>
+                <a:rPr lang="en-US" sz="1000" b="1" dirty="0"/>
+                <a:t>Virus initial concentration: 1e5 copies/mL</a:t>
+              </a:r>
+            </a:p>
+          </p:txBody>
+        </p:sp>
+        <p:sp>
+          <p:nvSpPr>
+            <p:cNvPr id="7" name="TextBox 6">
+              <a:extLst>
+                <a:ext uri="{FF2B5EF4-FFF2-40B4-BE49-F238E27FC236}">
+                  <a16:creationId xmlns:a16="http://schemas.microsoft.com/office/drawing/2014/main" id="{62BC0829-5B49-45FD-A7E9-9360828F14D0}"/>
+                </a:ext>
+              </a:extLst>
+            </p:cNvPr>
+            <p:cNvSpPr txBox="1"/>
+            <p:nvPr/>
+          </p:nvSpPr>
+          <p:spPr>
+            <a:xfrm>
+              <a:off x="3442996" y="3994794"/>
+              <a:ext cx="1187865" cy="553998"/>
+            </a:xfrm>
+            <a:prstGeom prst="rect">
+              <a:avLst/>
+            </a:prstGeom>
+            <a:noFill/>
+          </p:spPr>
+          <p:txBody>
+            <a:bodyPr wrap="square" rtlCol="0">
+              <a:spAutoFit/>
+            </a:bodyPr>
+            <a:lstStyle/>
+            <a:p>
+              <a:r>
+                <a:rPr lang="en-US" sz="1000" dirty="0"/>
+                <a:t>Data were averaged from [PMID 32125362]</a:t>
+              </a:r>
+              <a:endParaRPr lang="ru-RU" sz="1000" dirty="0"/>
+            </a:p>
+          </p:txBody>
+        </p:sp>
+      </p:grpSp>
+    </p:spTree>
+    <p:extLst>
+      <p:ext uri="{BB962C8B-B14F-4D97-AF65-F5344CB8AC3E}">
+        <p14:creationId xmlns:p14="http://schemas.microsoft.com/office/powerpoint/2010/main" val="69331855"/>
+      </p:ext>
+    </p:extLst>
+  </p:cSld>
+  <p:clrMapOvr>
+    <a:masterClrMapping/>
+  </p:clrMapOvr>
+</p:sld>
+</file>
+
+<file path=ppt/slides/slide19.xml><?xml version="1.0" encoding="utf-8"?>
+<p:sld xmlns:a="http://schemas.openxmlformats.org/drawingml/2006/main" xmlns:r="http://schemas.openxmlformats.org/officeDocument/2006/relationships" xmlns:p="http://schemas.openxmlformats.org/presentationml/2006/main">
+  <p:cSld>
+    <p:spTree>
+      <p:nvGrpSpPr>
+        <p:cNvPr id="1" name=""/>
+        <p:cNvGrpSpPr/>
+        <p:nvPr/>
+      </p:nvGrpSpPr>
+      <p:grpSpPr>
+        <a:xfrm>
+          <a:off x="0" y="0"/>
+          <a:ext cx="0" cy="0"/>
+          <a:chOff x="0" y="0"/>
+          <a:chExt cx="0" cy="0"/>
+        </a:xfrm>
+      </p:grpSpPr>
+      <p:sp>
+        <p:nvSpPr>
+          <p:cNvPr id="2" name="Заголовок 1"/>
+          <p:cNvSpPr>
+            <a:spLocks noGrp="1"/>
+          </p:cNvSpPr>
+          <p:nvPr>
+            <p:ph type="title"/>
+          </p:nvPr>
+        </p:nvSpPr>
+        <p:spPr/>
+        <p:txBody>
+          <a:bodyPr/>
+          <a:lstStyle/>
+          <a:p>
+            <a:r>
+              <a:rPr lang="en-US" dirty="0"/>
+              <a:t>Simulations: Viral load dynamics</a:t>
+            </a:r>
+            <a:endParaRPr lang="ru-RU" dirty="0"/>
+          </a:p>
+        </p:txBody>
+      </p:sp>
+      <p:sp>
+        <p:nvSpPr>
+          <p:cNvPr id="3" name="Номер слайда 2"/>
+          <p:cNvSpPr>
+            <a:spLocks noGrp="1"/>
+          </p:cNvSpPr>
+          <p:nvPr>
+            <p:ph type="sldNum" sz="quarter" idx="12"/>
+          </p:nvPr>
+        </p:nvSpPr>
+        <p:spPr/>
+        <p:txBody>
+          <a:bodyPr/>
+          <a:lstStyle/>
+          <a:p>
+            <a:fld id="{8D0E1ED9-1B5C-4060-9004-48CB920062D4}" type="slidenum">
+              <a:rPr lang="ru-RU" smtClean="0"/>
+              <a:pPr/>
+              <a:t>19</a:t>
+            </a:fld>
+            <a:endParaRPr lang="ru-RU"/>
+          </a:p>
+        </p:txBody>
+      </p:sp>
+      <p:sp>
+        <p:nvSpPr>
+          <p:cNvPr id="17" name="TextBox 16">
+            <a:extLst>
+              <a:ext uri="{FF2B5EF4-FFF2-40B4-BE49-F238E27FC236}">
+                <a16:creationId xmlns:a16="http://schemas.microsoft.com/office/drawing/2014/main" id="{69E8A2DA-6FD8-40B5-98C9-574AB8F19F2E}"/>
+              </a:ext>
+            </a:extLst>
+          </p:cNvPr>
+          <p:cNvSpPr txBox="1"/>
+          <p:nvPr/>
+        </p:nvSpPr>
+        <p:spPr>
+          <a:xfrm>
+            <a:off x="304800" y="5359398"/>
+            <a:ext cx="8712200" cy="1015663"/>
+          </a:xfrm>
+          <a:prstGeom prst="rect">
+            <a:avLst/>
+          </a:prstGeom>
+          <a:noFill/>
+        </p:spPr>
+        <p:txBody>
+          <a:bodyPr wrap="square" rtlCol="0">
+            <a:spAutoFit/>
+          </a:bodyPr>
+          <a:lstStyle/>
+          <a:p>
+            <a:pPr marL="285750" indent="-285750">
+              <a:buFont typeface="Arial" panose="020B0604020202020204" pitchFamily="34" charset="0"/>
+              <a:buChar char="•"/>
+            </a:pPr>
+            <a:r>
+              <a:rPr lang="en-US" sz="1500" dirty="0"/>
+              <a:t>There is a threshold in virus initial concentration in sputum. </a:t>
+            </a:r>
+          </a:p>
+          <a:p>
+            <a:pPr marL="285750" indent="-285750">
+              <a:buFont typeface="Arial" panose="020B0604020202020204" pitchFamily="34" charset="0"/>
+              <a:buChar char="•"/>
+            </a:pPr>
+            <a:r>
+              <a:rPr lang="en-US" sz="1500" dirty="0"/>
+              <a:t>The values above the threshold lead to substantial and transient virus load in sputum. </a:t>
+            </a:r>
+          </a:p>
+          <a:p>
+            <a:pPr marL="285750" indent="-285750">
+              <a:buFont typeface="Arial" panose="020B0604020202020204" pitchFamily="34" charset="0"/>
+              <a:buChar char="•"/>
+            </a:pPr>
+            <a:r>
+              <a:rPr lang="en-US" sz="1500" dirty="0"/>
+              <a:t>The values below the threshold do not allow detect virus in sputum at any time. </a:t>
+            </a:r>
+          </a:p>
+          <a:p>
+            <a:pPr marL="285750" indent="-285750">
+              <a:buFont typeface="Arial" panose="020B0604020202020204" pitchFamily="34" charset="0"/>
+              <a:buChar char="•"/>
+            </a:pPr>
+            <a:r>
+              <a:rPr lang="en-US" sz="1500" dirty="0"/>
+              <a:t>Increase in virus initial concentration results in higher peak of viral load which is faster achieved.  </a:t>
+            </a:r>
+            <a:endParaRPr lang="ru-RU" sz="1500" dirty="0"/>
+          </a:p>
+        </p:txBody>
+      </p:sp>
+      <p:grpSp>
+        <p:nvGrpSpPr>
+          <p:cNvPr id="8" name="Group 7">
+            <a:extLst>
+              <a:ext uri="{FF2B5EF4-FFF2-40B4-BE49-F238E27FC236}">
+                <a16:creationId xmlns:a16="http://schemas.microsoft.com/office/drawing/2014/main" id="{59F385CA-9BE3-4E44-85CC-E2C37EE818E8}"/>
+              </a:ext>
+            </a:extLst>
+          </p:cNvPr>
+          <p:cNvGrpSpPr/>
+          <p:nvPr/>
+        </p:nvGrpSpPr>
+        <p:grpSpPr>
+          <a:xfrm>
+            <a:off x="352553" y="802216"/>
+            <a:ext cx="8378928" cy="4451627"/>
+            <a:chOff x="352553" y="802216"/>
+            <a:chExt cx="8378928" cy="4451627"/>
+          </a:xfrm>
+        </p:grpSpPr>
+        <p:pic>
+          <p:nvPicPr>
+            <p:cNvPr id="6" name="Picture 5">
+              <a:extLst>
+                <a:ext uri="{FF2B5EF4-FFF2-40B4-BE49-F238E27FC236}">
+                  <a16:creationId xmlns:a16="http://schemas.microsoft.com/office/drawing/2014/main" id="{704E8671-B41F-47E1-8E8A-46FCD9900CAC}"/>
+                </a:ext>
+              </a:extLst>
+            </p:cNvPr>
+            <p:cNvPicPr>
+              <a:picLocks noChangeAspect="1"/>
+            </p:cNvPicPr>
+            <p:nvPr/>
+          </p:nvPicPr>
+          <p:blipFill>
+            <a:blip r:embed="rId2">
+              <a:extLst>
+                <a:ext uri="{28A0092B-C50C-407E-A947-70E740481C1C}">
+                  <a14:useLocalDpi xmlns:a14="http://schemas.microsoft.com/office/drawing/2010/main" val="0"/>
+                </a:ext>
+              </a:extLst>
+            </a:blip>
+            <a:stretch>
+              <a:fillRect/>
+            </a:stretch>
+          </p:blipFill>
+          <p:spPr>
+            <a:xfrm>
+              <a:off x="352553" y="802216"/>
+              <a:ext cx="8378928" cy="4451627"/>
+            </a:xfrm>
+            <a:prstGeom prst="rect">
+              <a:avLst/>
+            </a:prstGeom>
+          </p:spPr>
+        </p:pic>
+        <p:sp>
+          <p:nvSpPr>
+            <p:cNvPr id="12" name="TextBox 11">
+              <a:extLst>
+                <a:ext uri="{FF2B5EF4-FFF2-40B4-BE49-F238E27FC236}">
+                  <a16:creationId xmlns:a16="http://schemas.microsoft.com/office/drawing/2014/main" id="{E41B3741-1597-474C-A2C6-D9D3C10FC778}"/>
+                </a:ext>
+              </a:extLst>
+            </p:cNvPr>
+            <p:cNvSpPr txBox="1"/>
+            <p:nvPr/>
+          </p:nvSpPr>
+          <p:spPr>
+            <a:xfrm>
+              <a:off x="1367640" y="1273703"/>
+              <a:ext cx="2533790" cy="1169551"/>
+            </a:xfrm>
+            <a:prstGeom prst="rect">
+              <a:avLst/>
+            </a:prstGeom>
+            <a:noFill/>
+          </p:spPr>
+          <p:txBody>
+            <a:bodyPr wrap="square" rtlCol="0">
+              <a:spAutoFit/>
+            </a:bodyPr>
+            <a:lstStyle/>
+            <a:p>
+              <a:r>
+                <a:rPr lang="en-US" sz="1400" b="1" dirty="0"/>
+                <a:t>Virus initial concentration: </a:t>
+              </a:r>
+            </a:p>
+            <a:p>
+              <a:r>
+                <a:rPr lang="en-US" sz="1400" b="1" dirty="0"/>
+                <a:t>1.5e5 copies/mL</a:t>
+              </a:r>
+            </a:p>
+            <a:p>
+              <a:r>
+                <a:rPr lang="en-US" sz="1400" b="1" dirty="0">
+                  <a:solidFill>
+                    <a:srgbClr val="0000FF"/>
+                  </a:solidFill>
+                </a:rPr>
+                <a:t>1.25e5 copies/mL</a:t>
+              </a:r>
+            </a:p>
+            <a:p>
+              <a:r>
+                <a:rPr lang="en-US" sz="1400" b="1" dirty="0">
+                  <a:solidFill>
+                    <a:srgbClr val="FF0000"/>
+                  </a:solidFill>
+                </a:rPr>
+                <a:t>1.04e5 copies/mL</a:t>
+              </a:r>
+            </a:p>
+            <a:p>
+              <a:r>
+                <a:rPr lang="en-US" sz="1400" b="1" dirty="0">
+                  <a:solidFill>
+                    <a:srgbClr val="00B050"/>
+                  </a:solidFill>
+                </a:rPr>
+                <a:t>8.68e4 copies/mL</a:t>
+              </a:r>
+              <a:endParaRPr lang="ru-RU" sz="1400" b="1" dirty="0">
+                <a:solidFill>
+                  <a:srgbClr val="00B050"/>
+                </a:solidFill>
+              </a:endParaRPr>
+            </a:p>
+          </p:txBody>
+        </p:sp>
+        <p:cxnSp>
+          <p:nvCxnSpPr>
+            <p:cNvPr id="11" name="Straight Connector 10">
+              <a:extLst>
+                <a:ext uri="{FF2B5EF4-FFF2-40B4-BE49-F238E27FC236}">
+                  <a16:creationId xmlns:a16="http://schemas.microsoft.com/office/drawing/2014/main" id="{139E1EFA-6782-4856-82F4-F417163B2DC0}"/>
+                </a:ext>
+              </a:extLst>
+            </p:cNvPr>
+            <p:cNvCxnSpPr>
+              <a:cxnSpLocks/>
+            </p:cNvCxnSpPr>
+            <p:nvPr/>
+          </p:nvCxnSpPr>
+          <p:spPr>
+            <a:xfrm>
+              <a:off x="1281915" y="3406346"/>
+              <a:ext cx="7214385" cy="0"/>
+            </a:xfrm>
+            <a:prstGeom prst="line">
+              <a:avLst/>
+            </a:prstGeom>
+            <a:ln w="38100">
+              <a:solidFill>
+                <a:schemeClr val="accent2"/>
+              </a:solidFill>
+              <a:prstDash val="dash"/>
+            </a:ln>
+          </p:spPr>
+          <p:style>
+            <a:lnRef idx="1">
+              <a:schemeClr val="accent1"/>
+            </a:lnRef>
+            <a:fillRef idx="0">
+              <a:schemeClr val="accent1"/>
+            </a:fillRef>
+            <a:effectRef idx="0">
+              <a:schemeClr val="accent1"/>
+            </a:effectRef>
+            <a:fontRef idx="minor">
+              <a:schemeClr val="tx1"/>
+            </a:fontRef>
+          </p:style>
+        </p:cxnSp>
+        <p:sp>
+          <p:nvSpPr>
+            <p:cNvPr id="16" name="TextBox 15">
+              <a:extLst>
+                <a:ext uri="{FF2B5EF4-FFF2-40B4-BE49-F238E27FC236}">
+                  <a16:creationId xmlns:a16="http://schemas.microsoft.com/office/drawing/2014/main" id="{443EB322-E1F6-420F-A1CE-13123C7A42A1}"/>
+                </a:ext>
+              </a:extLst>
+            </p:cNvPr>
+            <p:cNvSpPr txBox="1"/>
+            <p:nvPr/>
+          </p:nvSpPr>
+          <p:spPr>
+            <a:xfrm>
+              <a:off x="1303116" y="3406346"/>
+              <a:ext cx="1660968" cy="307777"/>
+            </a:xfrm>
+            <a:prstGeom prst="rect">
+              <a:avLst/>
+            </a:prstGeom>
+            <a:noFill/>
+          </p:spPr>
+          <p:txBody>
+            <a:bodyPr wrap="none" rtlCol="0">
+              <a:spAutoFit/>
+            </a:bodyPr>
+            <a:lstStyle/>
+            <a:p>
+              <a:r>
+                <a:rPr lang="en-US" sz="1400" dirty="0">
+                  <a:solidFill>
+                    <a:schemeClr val="accent2"/>
+                  </a:solidFill>
+                </a:rPr>
+                <a:t>Limit of detection </a:t>
+              </a:r>
+              <a:endParaRPr lang="ru-RU" sz="1400" dirty="0">
+                <a:solidFill>
+                  <a:schemeClr val="accent2"/>
+                </a:solidFill>
+              </a:endParaRPr>
+            </a:p>
+          </p:txBody>
+        </p:sp>
+        <p:sp>
+          <p:nvSpPr>
+            <p:cNvPr id="13" name="TextBox 12">
+              <a:extLst>
+                <a:ext uri="{FF2B5EF4-FFF2-40B4-BE49-F238E27FC236}">
+                  <a16:creationId xmlns:a16="http://schemas.microsoft.com/office/drawing/2014/main" id="{947E558D-BE0C-4391-A7B7-D7CC04FB3C79}"/>
+                </a:ext>
+              </a:extLst>
+            </p:cNvPr>
+            <p:cNvSpPr txBox="1"/>
+            <p:nvPr/>
+          </p:nvSpPr>
+          <p:spPr>
+            <a:xfrm>
+              <a:off x="5917135" y="1267353"/>
+              <a:ext cx="2533790" cy="523220"/>
+            </a:xfrm>
+            <a:prstGeom prst="rect">
+              <a:avLst/>
+            </a:prstGeom>
+            <a:noFill/>
+          </p:spPr>
+          <p:txBody>
+            <a:bodyPr wrap="square" rtlCol="0">
+              <a:spAutoFit/>
+            </a:bodyPr>
+            <a:lstStyle/>
+            <a:p>
+              <a:r>
+                <a:rPr lang="en-US" sz="1400" b="1" dirty="0"/>
+                <a:t>Time of IR switching ON: </a:t>
+              </a:r>
+            </a:p>
+            <a:p>
+              <a:r>
+                <a:rPr lang="en-US" sz="1400" b="1" dirty="0"/>
+                <a:t>50 hour</a:t>
+              </a:r>
+            </a:p>
+          </p:txBody>
+        </p:sp>
+      </p:grpSp>
+    </p:spTree>
+    <p:extLst>
+      <p:ext uri="{BB962C8B-B14F-4D97-AF65-F5344CB8AC3E}">
+        <p14:creationId xmlns:p14="http://schemas.microsoft.com/office/powerpoint/2010/main" val="8036843"/>
+      </p:ext>
+    </p:extLst>
+  </p:cSld>
+  <p:clrMapOvr>
+    <a:masterClrMapping/>
+  </p:clrMapOvr>
+</p:sld>
+</file>
+
+<file path=ppt/slides/slide2.xml><?xml version="1.0" encoding="utf-8"?>
+<p:sld xmlns:a="http://schemas.openxmlformats.org/drawingml/2006/main" xmlns:r="http://schemas.openxmlformats.org/officeDocument/2006/relationships" xmlns:p="http://schemas.openxmlformats.org/presentationml/2006/main">
+  <p:cSld>
+    <p:spTree>
+      <p:nvGrpSpPr>
+        <p:cNvPr id="1" name=""/>
+        <p:cNvGrpSpPr/>
+        <p:nvPr/>
+      </p:nvGrpSpPr>
+      <p:grpSpPr>
+        <a:xfrm>
+          <a:off x="0" y="0"/>
+          <a:ext cx="0" cy="0"/>
+          <a:chOff x="0" y="0"/>
+          <a:chExt cx="0" cy="0"/>
+        </a:xfrm>
+      </p:grpSpPr>
+      <p:sp>
+        <p:nvSpPr>
+          <p:cNvPr id="2" name="Title 1">
+            <a:extLst>
+              <a:ext uri="{FF2B5EF4-FFF2-40B4-BE49-F238E27FC236}">
+                <a16:creationId xmlns:a16="http://schemas.microsoft.com/office/drawing/2014/main" id="{06409FCD-A934-497E-8A5A-D566EBF17CDC}"/>
+              </a:ext>
+            </a:extLst>
+          </p:cNvPr>
+          <p:cNvSpPr>
+            <a:spLocks noGrp="1"/>
+          </p:cNvSpPr>
+          <p:nvPr>
+            <p:ph type="title"/>
+          </p:nvPr>
+        </p:nvSpPr>
+        <p:spPr/>
+        <p:txBody>
+          <a:bodyPr>
+            <a:normAutofit/>
+          </a:bodyPr>
+          <a:lstStyle/>
+          <a:p>
+            <a:r>
+              <a:rPr lang="en-US" sz="2800" dirty="0"/>
+              <a:t>Commit date: 26.05.12</a:t>
+            </a:r>
+            <a:br>
+              <a:rPr lang="en-US" sz="2800" dirty="0"/>
+            </a:br>
+            <a:br>
+              <a:rPr lang="en-US" sz="2800" dirty="0"/>
+            </a:br>
+            <a:r>
+              <a:rPr lang="en-US" sz="2800" dirty="0"/>
+              <a:t>Commit name: updated version (VL_v0.1.1) of SARS-CoV-2 viral dynamics model </a:t>
+            </a:r>
+            <a:endParaRPr lang="ru-RU" sz="2800" dirty="0"/>
+          </a:p>
+        </p:txBody>
+      </p:sp>
+      <p:sp>
+        <p:nvSpPr>
+          <p:cNvPr id="3" name="Text Placeholder 2">
+            <a:extLst>
+              <a:ext uri="{FF2B5EF4-FFF2-40B4-BE49-F238E27FC236}">
+                <a16:creationId xmlns:a16="http://schemas.microsoft.com/office/drawing/2014/main" id="{C33FC260-48D1-4607-9B82-D2CD2E577DB2}"/>
+              </a:ext>
+            </a:extLst>
+          </p:cNvPr>
+          <p:cNvSpPr>
+            <a:spLocks noGrp="1"/>
+          </p:cNvSpPr>
+          <p:nvPr>
+            <p:ph type="body" idx="1"/>
+          </p:nvPr>
+        </p:nvSpPr>
+        <p:spPr/>
+        <p:txBody>
+          <a:bodyPr>
+            <a:normAutofit fontScale="85000" lnSpcReduction="20000"/>
+          </a:bodyPr>
+          <a:lstStyle/>
+          <a:p>
+            <a:r>
+              <a:rPr lang="en-US" dirty="0"/>
+              <a:t>Aims: </a:t>
+            </a:r>
+          </a:p>
+          <a:p>
+            <a:pPr marL="342900" indent="-342900">
+              <a:buFont typeface="Arial" panose="020B0604020202020204" pitchFamily="34" charset="0"/>
+              <a:buChar char="•"/>
+            </a:pPr>
+            <a:r>
+              <a:rPr lang="en-US" dirty="0"/>
+              <a:t>To introduce limitation in number of virions able to bind to PCII cell to avoid non-physiological accumulation of (</a:t>
+            </a:r>
+            <a:r>
+              <a:rPr lang="en-US" dirty="0" err="1"/>
+              <a:t>i</a:t>
+            </a:r>
+            <a:r>
+              <a:rPr lang="en-US" dirty="0"/>
+              <a:t>) the virions on the cell surface and (ii) virus RNA in nucleus</a:t>
+            </a:r>
+          </a:p>
+          <a:p>
+            <a:pPr marL="342900" indent="-342900">
+              <a:buFont typeface="Arial" panose="020B0604020202020204" pitchFamily="34" charset="0"/>
+              <a:buChar char="•"/>
+            </a:pPr>
+            <a:r>
+              <a:rPr lang="en-US" dirty="0"/>
+              <a:t>Reproduction of clinical data on virus load dynamics</a:t>
+            </a:r>
+            <a:endParaRPr lang="ru-RU" dirty="0"/>
+          </a:p>
+        </p:txBody>
+      </p:sp>
+      <p:sp>
+        <p:nvSpPr>
+          <p:cNvPr id="4" name="Slide Number Placeholder 3">
+            <a:extLst>
+              <a:ext uri="{FF2B5EF4-FFF2-40B4-BE49-F238E27FC236}">
+                <a16:creationId xmlns:a16="http://schemas.microsoft.com/office/drawing/2014/main" id="{B5E3C9EE-DEA7-4EF1-8145-1DF3D9BCBA61}"/>
+              </a:ext>
+            </a:extLst>
+          </p:cNvPr>
+          <p:cNvSpPr>
+            <a:spLocks noGrp="1"/>
+          </p:cNvSpPr>
+          <p:nvPr>
+            <p:ph type="sldNum" sz="quarter" idx="12"/>
+          </p:nvPr>
+        </p:nvSpPr>
+        <p:spPr/>
+        <p:txBody>
+          <a:bodyPr/>
+          <a:lstStyle/>
+          <a:p>
+            <a:fld id="{8D0E1ED9-1B5C-4060-9004-48CB920062D4}" type="slidenum">
+              <a:rPr lang="ru-RU" smtClean="0"/>
+              <a:pPr/>
+              <a:t>2</a:t>
+            </a:fld>
+            <a:endParaRPr lang="ru-RU"/>
+          </a:p>
+        </p:txBody>
+      </p:sp>
+    </p:spTree>
+    <p:extLst>
+      <p:ext uri="{BB962C8B-B14F-4D97-AF65-F5344CB8AC3E}">
+        <p14:creationId xmlns:p14="http://schemas.microsoft.com/office/powerpoint/2010/main" val="2704732925"/>
+      </p:ext>
+    </p:extLst>
+  </p:cSld>
+  <p:clrMapOvr>
+    <a:masterClrMapping/>
+  </p:clrMapOvr>
+</p:sld>
+</file>
+
+<file path=ppt/slides/slide20.xml><?xml version="1.0" encoding="utf-8"?>
+<p:sld xmlns:a="http://schemas.openxmlformats.org/drawingml/2006/main" xmlns:r="http://schemas.openxmlformats.org/officeDocument/2006/relationships" xmlns:p="http://schemas.openxmlformats.org/presentationml/2006/main">
+  <p:cSld>
+    <p:spTree>
+      <p:nvGrpSpPr>
+        <p:cNvPr id="1" name=""/>
+        <p:cNvGrpSpPr/>
+        <p:nvPr/>
+      </p:nvGrpSpPr>
+      <p:grpSpPr>
+        <a:xfrm>
+          <a:off x="0" y="0"/>
+          <a:ext cx="0" cy="0"/>
+          <a:chOff x="0" y="0"/>
+          <a:chExt cx="0" cy="0"/>
+        </a:xfrm>
+      </p:grpSpPr>
+      <p:sp>
+        <p:nvSpPr>
+          <p:cNvPr id="2" name="Заголовок 1"/>
+          <p:cNvSpPr>
+            <a:spLocks noGrp="1"/>
+          </p:cNvSpPr>
+          <p:nvPr>
+            <p:ph type="title"/>
+          </p:nvPr>
+        </p:nvSpPr>
+        <p:spPr/>
+        <p:txBody>
+          <a:bodyPr>
+            <a:normAutofit fontScale="90000"/>
+          </a:bodyPr>
+          <a:lstStyle/>
+          <a:p>
+            <a:r>
+              <a:rPr lang="en-US" dirty="0"/>
+              <a:t>Simulations: Viral load dynamics w/o IR induction</a:t>
+            </a:r>
+            <a:endParaRPr lang="ru-RU" dirty="0"/>
+          </a:p>
+        </p:txBody>
+      </p:sp>
+      <p:sp>
+        <p:nvSpPr>
+          <p:cNvPr id="3" name="Номер слайда 2"/>
+          <p:cNvSpPr>
+            <a:spLocks noGrp="1"/>
+          </p:cNvSpPr>
+          <p:nvPr>
+            <p:ph type="sldNum" sz="quarter" idx="12"/>
+          </p:nvPr>
+        </p:nvSpPr>
+        <p:spPr/>
+        <p:txBody>
+          <a:bodyPr/>
+          <a:lstStyle/>
+          <a:p>
+            <a:fld id="{8D0E1ED9-1B5C-4060-9004-48CB920062D4}" type="slidenum">
+              <a:rPr lang="ru-RU" smtClean="0"/>
+              <a:pPr/>
+              <a:t>20</a:t>
+            </a:fld>
+            <a:endParaRPr lang="ru-RU"/>
+          </a:p>
+        </p:txBody>
+      </p:sp>
+      <p:grpSp>
+        <p:nvGrpSpPr>
+          <p:cNvPr id="15" name="Group 14">
+            <a:extLst>
+              <a:ext uri="{FF2B5EF4-FFF2-40B4-BE49-F238E27FC236}">
+                <a16:creationId xmlns:a16="http://schemas.microsoft.com/office/drawing/2014/main" id="{78C3DA08-3E4C-48B2-920B-652930ACB136}"/>
+              </a:ext>
+            </a:extLst>
+          </p:cNvPr>
+          <p:cNvGrpSpPr/>
+          <p:nvPr/>
+        </p:nvGrpSpPr>
+        <p:grpSpPr>
+          <a:xfrm>
+            <a:off x="846666" y="824542"/>
+            <a:ext cx="6706349" cy="3900379"/>
+            <a:chOff x="846666" y="824542"/>
+            <a:chExt cx="6706349" cy="3900379"/>
+          </a:xfrm>
+        </p:grpSpPr>
+        <p:pic>
+          <p:nvPicPr>
+            <p:cNvPr id="5" name="Picture 4">
+              <a:extLst>
+                <a:ext uri="{FF2B5EF4-FFF2-40B4-BE49-F238E27FC236}">
+                  <a16:creationId xmlns:a16="http://schemas.microsoft.com/office/drawing/2014/main" id="{CD7CB10D-B253-4C9A-889C-B46312D8FD60}"/>
+                </a:ext>
+              </a:extLst>
+            </p:cNvPr>
+            <p:cNvPicPr>
+              <a:picLocks noChangeAspect="1"/>
+            </p:cNvPicPr>
+            <p:nvPr/>
+          </p:nvPicPr>
+          <p:blipFill>
+            <a:blip r:embed="rId2">
+              <a:extLst>
+                <a:ext uri="{28A0092B-C50C-407E-A947-70E740481C1C}">
+                  <a14:useLocalDpi xmlns:a14="http://schemas.microsoft.com/office/drawing/2010/main" val="0"/>
+                </a:ext>
+              </a:extLst>
+            </a:blip>
+            <a:stretch>
+              <a:fillRect/>
+            </a:stretch>
+          </p:blipFill>
+          <p:spPr>
+            <a:xfrm>
+              <a:off x="846666" y="824542"/>
+              <a:ext cx="6706349" cy="3900379"/>
+            </a:xfrm>
+            <a:prstGeom prst="rect">
+              <a:avLst/>
+            </a:prstGeom>
+          </p:spPr>
+        </p:pic>
+        <p:cxnSp>
+          <p:nvCxnSpPr>
+            <p:cNvPr id="11" name="Straight Connector 10">
+              <a:extLst>
+                <a:ext uri="{FF2B5EF4-FFF2-40B4-BE49-F238E27FC236}">
+                  <a16:creationId xmlns:a16="http://schemas.microsoft.com/office/drawing/2014/main" id="{139E1EFA-6782-4856-82F4-F417163B2DC0}"/>
+                </a:ext>
+              </a:extLst>
+            </p:cNvPr>
+            <p:cNvCxnSpPr>
+              <a:cxnSpLocks/>
+            </p:cNvCxnSpPr>
+            <p:nvPr/>
+          </p:nvCxnSpPr>
+          <p:spPr>
+            <a:xfrm>
+              <a:off x="1709139" y="2568132"/>
+              <a:ext cx="5622994" cy="0"/>
+            </a:xfrm>
+            <a:prstGeom prst="line">
+              <a:avLst/>
+            </a:prstGeom>
+            <a:ln w="38100">
+              <a:solidFill>
+                <a:schemeClr val="accent2"/>
+              </a:solidFill>
+              <a:prstDash val="dash"/>
+            </a:ln>
+          </p:spPr>
+          <p:style>
+            <a:lnRef idx="1">
+              <a:schemeClr val="accent1"/>
+            </a:lnRef>
+            <a:fillRef idx="0">
+              <a:schemeClr val="accent1"/>
+            </a:fillRef>
+            <a:effectRef idx="0">
+              <a:schemeClr val="accent1"/>
+            </a:effectRef>
+            <a:fontRef idx="minor">
+              <a:schemeClr val="tx1"/>
+            </a:fontRef>
+          </p:style>
+        </p:cxnSp>
+        <p:sp>
+          <p:nvSpPr>
+            <p:cNvPr id="16" name="TextBox 15">
+              <a:extLst>
+                <a:ext uri="{FF2B5EF4-FFF2-40B4-BE49-F238E27FC236}">
+                  <a16:creationId xmlns:a16="http://schemas.microsoft.com/office/drawing/2014/main" id="{443EB322-E1F6-420F-A1CE-13123C7A42A1}"/>
+                </a:ext>
+              </a:extLst>
+            </p:cNvPr>
+            <p:cNvSpPr txBox="1"/>
+            <p:nvPr/>
+          </p:nvSpPr>
+          <p:spPr>
+            <a:xfrm>
+              <a:off x="1751852" y="2304852"/>
+              <a:ext cx="1448730" cy="276999"/>
+            </a:xfrm>
+            <a:prstGeom prst="rect">
+              <a:avLst/>
+            </a:prstGeom>
+            <a:noFill/>
+          </p:spPr>
+          <p:txBody>
+            <a:bodyPr wrap="none" rtlCol="0">
+              <a:spAutoFit/>
+            </a:bodyPr>
+            <a:lstStyle/>
+            <a:p>
+              <a:r>
+                <a:rPr lang="en-US" sz="1200" dirty="0">
+                  <a:solidFill>
+                    <a:schemeClr val="accent2"/>
+                  </a:solidFill>
+                </a:rPr>
+                <a:t>Limit of detection </a:t>
+              </a:r>
+              <a:endParaRPr lang="ru-RU" sz="1200" dirty="0">
+                <a:solidFill>
+                  <a:schemeClr val="accent2"/>
+                </a:solidFill>
+              </a:endParaRPr>
+            </a:p>
+          </p:txBody>
+        </p:sp>
+        <p:sp>
+          <p:nvSpPr>
+            <p:cNvPr id="12" name="TextBox 11">
+              <a:extLst>
+                <a:ext uri="{FF2B5EF4-FFF2-40B4-BE49-F238E27FC236}">
+                  <a16:creationId xmlns:a16="http://schemas.microsoft.com/office/drawing/2014/main" id="{E41B3741-1597-474C-A2C6-D9D3C10FC778}"/>
+                </a:ext>
+              </a:extLst>
+            </p:cNvPr>
+            <p:cNvSpPr txBox="1"/>
+            <p:nvPr/>
+          </p:nvSpPr>
+          <p:spPr>
+            <a:xfrm>
+              <a:off x="4916119" y="1182683"/>
+              <a:ext cx="2162014" cy="1384995"/>
+            </a:xfrm>
+            <a:prstGeom prst="rect">
+              <a:avLst/>
+            </a:prstGeom>
+            <a:noFill/>
+          </p:spPr>
+          <p:txBody>
+            <a:bodyPr wrap="square" rtlCol="0">
+              <a:spAutoFit/>
+            </a:bodyPr>
+            <a:lstStyle/>
+            <a:p>
+              <a:r>
+                <a:rPr lang="en-US" sz="1200" b="1" dirty="0"/>
+                <a:t>Virus initial concentration: </a:t>
+              </a:r>
+            </a:p>
+            <a:p>
+              <a:r>
+                <a:rPr lang="en-US" sz="1200" b="1" dirty="0"/>
+                <a:t>1.2e5 copies/mL</a:t>
+              </a:r>
+            </a:p>
+            <a:p>
+              <a:r>
+                <a:rPr lang="en-US" sz="1200" b="1" dirty="0">
+                  <a:solidFill>
+                    <a:srgbClr val="0000FF"/>
+                  </a:solidFill>
+                </a:rPr>
+                <a:t>3e4 copies/mL</a:t>
+              </a:r>
+            </a:p>
+            <a:p>
+              <a:r>
+                <a:rPr lang="en-US" sz="1200" b="1" dirty="0">
+                  <a:solidFill>
+                    <a:srgbClr val="FF0000"/>
+                  </a:solidFill>
+                </a:rPr>
+                <a:t>7.5e3 copies/mL</a:t>
+              </a:r>
+            </a:p>
+            <a:p>
+              <a:r>
+                <a:rPr lang="en-US" sz="1200" b="1" dirty="0">
+                  <a:solidFill>
+                    <a:srgbClr val="00B050"/>
+                  </a:solidFill>
+                </a:rPr>
+                <a:t>1.9e3 copies/mL</a:t>
+              </a:r>
+            </a:p>
+            <a:p>
+              <a:r>
+                <a:rPr lang="en-US" sz="1200" b="1" dirty="0">
+                  <a:solidFill>
+                    <a:srgbClr val="FF33CC"/>
+                  </a:solidFill>
+                </a:rPr>
+                <a:t>4.7e2 copies/mL</a:t>
+              </a:r>
+            </a:p>
+            <a:p>
+              <a:r>
+                <a:rPr lang="en-US" sz="1200" b="1" dirty="0">
+                  <a:solidFill>
+                    <a:srgbClr val="808000"/>
+                  </a:solidFill>
+                </a:rPr>
+                <a:t>1.2e2 copies/mL</a:t>
+              </a:r>
+              <a:endParaRPr lang="ru-RU" sz="1200" b="1" dirty="0">
+                <a:solidFill>
+                  <a:srgbClr val="808000"/>
+                </a:solidFill>
+              </a:endParaRPr>
+            </a:p>
+          </p:txBody>
+        </p:sp>
+      </p:grpSp>
+      <p:sp>
+        <p:nvSpPr>
+          <p:cNvPr id="17" name="TextBox 16">
+            <a:extLst>
+              <a:ext uri="{FF2B5EF4-FFF2-40B4-BE49-F238E27FC236}">
+                <a16:creationId xmlns:a16="http://schemas.microsoft.com/office/drawing/2014/main" id="{69E8A2DA-6FD8-40B5-98C9-574AB8F19F2E}"/>
+              </a:ext>
+            </a:extLst>
+          </p:cNvPr>
+          <p:cNvSpPr txBox="1"/>
+          <p:nvPr/>
+        </p:nvSpPr>
+        <p:spPr>
+          <a:xfrm>
+            <a:off x="195320" y="4622792"/>
+            <a:ext cx="8821680" cy="2215991"/>
+          </a:xfrm>
+          <a:prstGeom prst="rect">
+            <a:avLst/>
+          </a:prstGeom>
+          <a:solidFill>
+            <a:schemeClr val="bg1"/>
+          </a:solidFill>
+        </p:spPr>
+        <p:txBody>
+          <a:bodyPr wrap="square" rtlCol="0">
+            <a:spAutoFit/>
+          </a:bodyPr>
+          <a:lstStyle/>
+          <a:p>
+            <a:r>
+              <a:rPr lang="en-US" sz="1500" i="1" dirty="0"/>
+              <a:t>SIMULATION DESIGN:</a:t>
+            </a:r>
+            <a:r>
+              <a:rPr lang="en-US" sz="1500" dirty="0"/>
+              <a:t> </a:t>
+            </a:r>
+            <a:r>
+              <a:rPr lang="en-US" sz="1200" dirty="0"/>
+              <a:t>(</a:t>
+            </a:r>
+            <a:r>
+              <a:rPr lang="en-US" sz="1200" dirty="0" err="1"/>
+              <a:t>i</a:t>
+            </a:r>
+            <a:r>
+              <a:rPr lang="en-US" sz="1200" dirty="0"/>
+              <a:t>) initial COV concentration in alveolar surfactant is varied from 2e-3 to 1.9e-6 </a:t>
+            </a:r>
+            <a:r>
+              <a:rPr lang="en-US" sz="1200" dirty="0" err="1"/>
+              <a:t>pM</a:t>
+            </a:r>
+            <a:r>
+              <a:rPr lang="en-US" sz="1200" dirty="0"/>
+              <a:t>, (ii) there is no induction of IR, i.e. </a:t>
+            </a:r>
+            <a:r>
+              <a:rPr lang="en-US" sz="1200" dirty="0" err="1"/>
+              <a:t>switch_ir</a:t>
+            </a:r>
+            <a:r>
+              <a:rPr lang="en-US" sz="1200" dirty="0"/>
+              <a:t> = 0 for any time after infection</a:t>
+            </a:r>
+            <a:endParaRPr lang="en-US" sz="1400" dirty="0"/>
+          </a:p>
+          <a:p>
+            <a:r>
+              <a:rPr lang="en-US" sz="1500" dirty="0">
+                <a:latin typeface="+mj-lt"/>
+              </a:rPr>
+              <a:t>RESULTS:</a:t>
+            </a:r>
+            <a:r>
+              <a:rPr lang="en-US" sz="1500" dirty="0"/>
+              <a:t> </a:t>
+            </a:r>
+          </a:p>
+          <a:p>
+            <a:pPr marL="285750" indent="-285750">
+              <a:buFont typeface="Arial" panose="020B0604020202020204" pitchFamily="34" charset="0"/>
+              <a:buChar char="•"/>
+            </a:pPr>
+            <a:r>
+              <a:rPr lang="en-US" sz="1200" dirty="0"/>
+              <a:t>There is a threshold in virus initial concentration. The values above the threshold lead to substantial steady state virus load. The values below the threshold do not allow detect virus in sputum at any time, i.e. viral load tends to steady state value equal to 0.  </a:t>
+            </a:r>
+          </a:p>
+          <a:p>
+            <a:pPr marL="285750" indent="-285750">
+              <a:buFont typeface="Arial" panose="020B0604020202020204" pitchFamily="34" charset="0"/>
+              <a:buChar char="•"/>
+            </a:pPr>
+            <a:r>
+              <a:rPr lang="en-US" sz="1200" dirty="0"/>
+              <a:t>ODE system has 1 unstable and 2 stable steady states. One of the stable steady states correspond to 0 viral load and other corresponds to very substantial viral load. </a:t>
+            </a:r>
+          </a:p>
+          <a:p>
+            <a:pPr marL="285750" indent="-285750">
+              <a:buFont typeface="Arial" panose="020B0604020202020204" pitchFamily="34" charset="0"/>
+              <a:buChar char="•"/>
+            </a:pPr>
+            <a:r>
+              <a:rPr lang="en-US" sz="1200" dirty="0"/>
+              <a:t>Model is able to describes self curing dynamics, i.e., viral load tends to 0 when initial virus concentration is below threshold. If initial virus concentration is above threshold then virtual patient is being infected and viral load tends to very high value with time. </a:t>
+            </a:r>
+            <a:endParaRPr lang="ru-RU" sz="1200" dirty="0"/>
+          </a:p>
+        </p:txBody>
+      </p:sp>
+    </p:spTree>
+    <p:extLst>
+      <p:ext uri="{BB962C8B-B14F-4D97-AF65-F5344CB8AC3E}">
+        <p14:creationId xmlns:p14="http://schemas.microsoft.com/office/powerpoint/2010/main" val="1328953535"/>
+      </p:ext>
+    </p:extLst>
+  </p:cSld>
+  <p:clrMapOvr>
+    <a:masterClrMapping/>
+  </p:clrMapOvr>
+</p:sld>
+</file>
+
+<file path=ppt/slides/slide21.xml><?xml version="1.0" encoding="utf-8"?>
+<p:sld xmlns:a="http://schemas.openxmlformats.org/drawingml/2006/main" xmlns:r="http://schemas.openxmlformats.org/officeDocument/2006/relationships" xmlns:p="http://schemas.openxmlformats.org/presentationml/2006/main">
+  <p:cSld>
+    <p:spTree>
+      <p:nvGrpSpPr>
+        <p:cNvPr id="1" name=""/>
+        <p:cNvGrpSpPr/>
+        <p:nvPr/>
+      </p:nvGrpSpPr>
+      <p:grpSpPr>
+        <a:xfrm>
+          <a:off x="0" y="0"/>
+          <a:ext cx="0" cy="0"/>
+          <a:chOff x="0" y="0"/>
+          <a:chExt cx="0" cy="0"/>
+        </a:xfrm>
+      </p:grpSpPr>
+      <p:sp>
+        <p:nvSpPr>
+          <p:cNvPr id="2" name="Заголовок 1"/>
+          <p:cNvSpPr>
+            <a:spLocks noGrp="1"/>
+          </p:cNvSpPr>
+          <p:nvPr>
+            <p:ph type="title"/>
+          </p:nvPr>
+        </p:nvSpPr>
+        <p:spPr/>
+        <p:txBody>
+          <a:bodyPr/>
+          <a:lstStyle/>
+          <a:p>
+            <a:r>
+              <a:rPr lang="en-US" dirty="0"/>
+              <a:t>Simulations: Effect of delay in IR on viral load</a:t>
+            </a:r>
+            <a:endParaRPr lang="ru-RU" dirty="0"/>
+          </a:p>
+        </p:txBody>
+      </p:sp>
+      <p:sp>
+        <p:nvSpPr>
+          <p:cNvPr id="3" name="Номер слайда 2"/>
+          <p:cNvSpPr>
+            <a:spLocks noGrp="1"/>
+          </p:cNvSpPr>
+          <p:nvPr>
+            <p:ph type="sldNum" sz="quarter" idx="12"/>
+          </p:nvPr>
+        </p:nvSpPr>
+        <p:spPr/>
+        <p:txBody>
+          <a:bodyPr/>
+          <a:lstStyle/>
+          <a:p>
+            <a:fld id="{8D0E1ED9-1B5C-4060-9004-48CB920062D4}" type="slidenum">
+              <a:rPr lang="ru-RU" smtClean="0"/>
+              <a:pPr/>
+              <a:t>21</a:t>
+            </a:fld>
+            <a:endParaRPr lang="ru-RU"/>
+          </a:p>
+        </p:txBody>
+      </p:sp>
+      <p:sp>
+        <p:nvSpPr>
+          <p:cNvPr id="17" name="TextBox 16">
+            <a:extLst>
+              <a:ext uri="{FF2B5EF4-FFF2-40B4-BE49-F238E27FC236}">
+                <a16:creationId xmlns:a16="http://schemas.microsoft.com/office/drawing/2014/main" id="{69E8A2DA-6FD8-40B5-98C9-574AB8F19F2E}"/>
+              </a:ext>
+            </a:extLst>
+          </p:cNvPr>
+          <p:cNvSpPr txBox="1"/>
+          <p:nvPr/>
+        </p:nvSpPr>
+        <p:spPr>
+          <a:xfrm>
+            <a:off x="7056870" y="773295"/>
+            <a:ext cx="2087130" cy="5724644"/>
+          </a:xfrm>
+          <a:prstGeom prst="rect">
+            <a:avLst/>
+          </a:prstGeom>
+          <a:noFill/>
+        </p:spPr>
+        <p:txBody>
+          <a:bodyPr wrap="square" rtlCol="0">
+            <a:spAutoFit/>
+          </a:bodyPr>
+          <a:lstStyle/>
+          <a:p>
+            <a:r>
+              <a:rPr lang="en-US" sz="1400" dirty="0"/>
+              <a:t>SIMULATION DESIGN: </a:t>
+            </a:r>
+          </a:p>
+          <a:p>
+            <a:pPr marL="285750" indent="-285750">
+              <a:buFont typeface="Arial" panose="020B0604020202020204" pitchFamily="34" charset="0"/>
+              <a:buChar char="•"/>
+            </a:pPr>
+            <a:r>
+              <a:rPr lang="en-US" sz="1200" dirty="0"/>
+              <a:t>Start time of Immune response (IR) was varied from 10 to 320 hours past infection. </a:t>
+            </a:r>
+          </a:p>
+          <a:p>
+            <a:pPr marL="285750" indent="-285750">
+              <a:buFont typeface="Arial" panose="020B0604020202020204" pitchFamily="34" charset="0"/>
+              <a:buChar char="•"/>
+            </a:pPr>
+            <a:r>
+              <a:rPr lang="en-US" sz="1200" dirty="0"/>
+              <a:t>Amplitude of IR and virus initial concentration in sputum were kept the same for various start time</a:t>
+            </a:r>
+          </a:p>
+          <a:p>
+            <a:pPr marL="285750" indent="-285750">
+              <a:buFont typeface="Arial" panose="020B0604020202020204" pitchFamily="34" charset="0"/>
+              <a:buChar char="•"/>
+            </a:pPr>
+            <a:r>
+              <a:rPr lang="en-US" sz="1200" dirty="0"/>
+              <a:t>At each start time viral load dynamics in sputum was simulated</a:t>
+            </a:r>
+          </a:p>
+          <a:p>
+            <a:pPr marL="285750" indent="-285750">
+              <a:buFont typeface="Arial" panose="020B0604020202020204" pitchFamily="34" charset="0"/>
+              <a:buChar char="•"/>
+            </a:pPr>
+            <a:endParaRPr lang="en-US" sz="1400" dirty="0"/>
+          </a:p>
+          <a:p>
+            <a:r>
+              <a:rPr lang="en-US" sz="1400" dirty="0"/>
+              <a:t>RESULTS: </a:t>
+            </a:r>
+          </a:p>
+          <a:p>
+            <a:pPr marL="285750" indent="-285750">
+              <a:buFont typeface="Arial" panose="020B0604020202020204" pitchFamily="34" charset="0"/>
+              <a:buChar char="•"/>
+            </a:pPr>
+            <a:r>
+              <a:rPr lang="en-US" sz="1200" dirty="0"/>
+              <a:t>Early IR (10 and </a:t>
+            </a:r>
+            <a:r>
+              <a:rPr lang="en-US" sz="1200" dirty="0">
+                <a:solidFill>
+                  <a:srgbClr val="0000FF"/>
+                </a:solidFill>
+              </a:rPr>
+              <a:t>20</a:t>
+            </a:r>
+            <a:r>
+              <a:rPr lang="en-US" sz="1200" dirty="0"/>
+              <a:t> hours) do not allow detect virus in sputum at any time. </a:t>
+            </a:r>
+          </a:p>
+          <a:p>
+            <a:pPr marL="285750" indent="-285750">
+              <a:buFont typeface="Arial" panose="020B0604020202020204" pitchFamily="34" charset="0"/>
+              <a:buChar char="•"/>
+            </a:pPr>
+            <a:r>
+              <a:rPr lang="en-US" sz="1200" dirty="0"/>
+              <a:t>Delay in IR start time substantially increases peak viral load and shifts the peak to later time</a:t>
+            </a:r>
+          </a:p>
+          <a:p>
+            <a:pPr marL="285750" indent="-285750">
+              <a:buFont typeface="Arial" panose="020B0604020202020204" pitchFamily="34" charset="0"/>
+              <a:buChar char="•"/>
+            </a:pPr>
+            <a:r>
+              <a:rPr lang="en-US" sz="1200" dirty="0"/>
+              <a:t>Very late IR start time leads to plateau in viral load dynamics with maximal viral load value</a:t>
+            </a:r>
+            <a:endParaRPr lang="ru-RU" sz="1200" dirty="0"/>
+          </a:p>
+        </p:txBody>
+      </p:sp>
+      <p:grpSp>
+        <p:nvGrpSpPr>
+          <p:cNvPr id="39" name="Group 38">
+            <a:extLst>
+              <a:ext uri="{FF2B5EF4-FFF2-40B4-BE49-F238E27FC236}">
+                <a16:creationId xmlns:a16="http://schemas.microsoft.com/office/drawing/2014/main" id="{26DE0D7D-3179-487E-8D38-F2331554E533}"/>
+              </a:ext>
+            </a:extLst>
+          </p:cNvPr>
+          <p:cNvGrpSpPr/>
+          <p:nvPr/>
+        </p:nvGrpSpPr>
+        <p:grpSpPr>
+          <a:xfrm>
+            <a:off x="0" y="783258"/>
+            <a:ext cx="7115175" cy="5521943"/>
+            <a:chOff x="0" y="783258"/>
+            <a:chExt cx="7115175" cy="5521943"/>
+          </a:xfrm>
+        </p:grpSpPr>
+        <p:pic>
+          <p:nvPicPr>
+            <p:cNvPr id="14" name="Picture 13">
+              <a:extLst>
+                <a:ext uri="{FF2B5EF4-FFF2-40B4-BE49-F238E27FC236}">
+                  <a16:creationId xmlns:a16="http://schemas.microsoft.com/office/drawing/2014/main" id="{41356777-9059-4297-AFA8-65133C7B92E2}"/>
+                </a:ext>
+              </a:extLst>
+            </p:cNvPr>
+            <p:cNvPicPr>
+              <a:picLocks noChangeAspect="1"/>
+            </p:cNvPicPr>
+            <p:nvPr/>
+          </p:nvPicPr>
+          <p:blipFill>
+            <a:blip r:embed="rId2">
+              <a:extLst>
+                <a:ext uri="{28A0092B-C50C-407E-A947-70E740481C1C}">
+                  <a14:useLocalDpi xmlns:a14="http://schemas.microsoft.com/office/drawing/2010/main" val="0"/>
+                </a:ext>
+              </a:extLst>
+            </a:blip>
+            <a:stretch>
+              <a:fillRect/>
+            </a:stretch>
+          </p:blipFill>
+          <p:spPr>
+            <a:xfrm>
+              <a:off x="0" y="783258"/>
+              <a:ext cx="7115175" cy="3003215"/>
+            </a:xfrm>
+            <a:prstGeom prst="rect">
+              <a:avLst/>
+            </a:prstGeom>
+          </p:spPr>
+        </p:pic>
+        <p:pic>
+          <p:nvPicPr>
+            <p:cNvPr id="18" name="Picture 17">
+              <a:extLst>
+                <a:ext uri="{FF2B5EF4-FFF2-40B4-BE49-F238E27FC236}">
+                  <a16:creationId xmlns:a16="http://schemas.microsoft.com/office/drawing/2014/main" id="{12B091E1-2CC4-4394-9782-C024EE5CA420}"/>
+                </a:ext>
+              </a:extLst>
+            </p:cNvPr>
+            <p:cNvPicPr>
+              <a:picLocks noChangeAspect="1"/>
+            </p:cNvPicPr>
+            <p:nvPr/>
+          </p:nvPicPr>
+          <p:blipFill>
+            <a:blip r:embed="rId3">
+              <a:extLst>
+                <a:ext uri="{28A0092B-C50C-407E-A947-70E740481C1C}">
+                  <a14:useLocalDpi xmlns:a14="http://schemas.microsoft.com/office/drawing/2010/main" val="0"/>
+                </a:ext>
+              </a:extLst>
+            </a:blip>
+            <a:stretch>
+              <a:fillRect/>
+            </a:stretch>
+          </p:blipFill>
+          <p:spPr>
+            <a:xfrm>
+              <a:off x="0" y="3301986"/>
+              <a:ext cx="7115175" cy="3003215"/>
+            </a:xfrm>
+            <a:prstGeom prst="rect">
+              <a:avLst/>
+            </a:prstGeom>
+          </p:spPr>
+        </p:pic>
+        <p:cxnSp>
+          <p:nvCxnSpPr>
+            <p:cNvPr id="11" name="Straight Connector 10">
+              <a:extLst>
+                <a:ext uri="{FF2B5EF4-FFF2-40B4-BE49-F238E27FC236}">
+                  <a16:creationId xmlns:a16="http://schemas.microsoft.com/office/drawing/2014/main" id="{139E1EFA-6782-4856-82F4-F417163B2DC0}"/>
+                </a:ext>
+              </a:extLst>
+            </p:cNvPr>
+            <p:cNvCxnSpPr>
+              <a:cxnSpLocks/>
+            </p:cNvCxnSpPr>
+            <p:nvPr/>
+          </p:nvCxnSpPr>
+          <p:spPr>
+            <a:xfrm>
+              <a:off x="839438" y="5298356"/>
+              <a:ext cx="6051842" cy="0"/>
+            </a:xfrm>
+            <a:prstGeom prst="line">
+              <a:avLst/>
+            </a:prstGeom>
+            <a:ln w="38100">
+              <a:solidFill>
+                <a:schemeClr val="accent2"/>
+              </a:solidFill>
+              <a:prstDash val="dash"/>
+            </a:ln>
+          </p:spPr>
+          <p:style>
+            <a:lnRef idx="1">
+              <a:schemeClr val="accent1"/>
+            </a:lnRef>
+            <a:fillRef idx="0">
+              <a:schemeClr val="accent1"/>
+            </a:fillRef>
+            <a:effectRef idx="0">
+              <a:schemeClr val="accent1"/>
+            </a:effectRef>
+            <a:fontRef idx="minor">
+              <a:schemeClr val="tx1"/>
+            </a:fontRef>
+          </p:style>
+        </p:cxnSp>
+        <p:sp>
+          <p:nvSpPr>
+            <p:cNvPr id="12" name="TextBox 11">
+              <a:extLst>
+                <a:ext uri="{FF2B5EF4-FFF2-40B4-BE49-F238E27FC236}">
+                  <a16:creationId xmlns:a16="http://schemas.microsoft.com/office/drawing/2014/main" id="{E41B3741-1597-474C-A2C6-D9D3C10FC778}"/>
+                </a:ext>
+              </a:extLst>
+            </p:cNvPr>
+            <p:cNvSpPr txBox="1"/>
+            <p:nvPr/>
+          </p:nvSpPr>
+          <p:spPr>
+            <a:xfrm>
+              <a:off x="4335985" y="3628717"/>
+              <a:ext cx="2533790" cy="523220"/>
+            </a:xfrm>
+            <a:prstGeom prst="rect">
+              <a:avLst/>
+            </a:prstGeom>
+            <a:noFill/>
+          </p:spPr>
+          <p:txBody>
+            <a:bodyPr wrap="square" rtlCol="0">
+              <a:spAutoFit/>
+            </a:bodyPr>
+            <a:lstStyle/>
+            <a:p>
+              <a:r>
+                <a:rPr lang="en-US" sz="1400" b="1" dirty="0"/>
+                <a:t>Virus initial concentration: </a:t>
+              </a:r>
+            </a:p>
+            <a:p>
+              <a:r>
+                <a:rPr lang="en-US" sz="1400" b="1" dirty="0"/>
+                <a:t>1.2e5 copies/mL</a:t>
+              </a:r>
+            </a:p>
+          </p:txBody>
+        </p:sp>
+        <p:sp>
+          <p:nvSpPr>
+            <p:cNvPr id="16" name="TextBox 15">
+              <a:extLst>
+                <a:ext uri="{FF2B5EF4-FFF2-40B4-BE49-F238E27FC236}">
+                  <a16:creationId xmlns:a16="http://schemas.microsoft.com/office/drawing/2014/main" id="{443EB322-E1F6-420F-A1CE-13123C7A42A1}"/>
+                </a:ext>
+              </a:extLst>
+            </p:cNvPr>
+            <p:cNvSpPr txBox="1"/>
+            <p:nvPr/>
+          </p:nvSpPr>
+          <p:spPr>
+            <a:xfrm>
+              <a:off x="5643918" y="5006652"/>
+              <a:ext cx="1350050" cy="261610"/>
+            </a:xfrm>
+            <a:prstGeom prst="rect">
+              <a:avLst/>
+            </a:prstGeom>
+            <a:noFill/>
+          </p:spPr>
+          <p:txBody>
+            <a:bodyPr wrap="none" rtlCol="0">
+              <a:spAutoFit/>
+            </a:bodyPr>
+            <a:lstStyle/>
+            <a:p>
+              <a:r>
+                <a:rPr lang="en-US" sz="1100" dirty="0">
+                  <a:solidFill>
+                    <a:schemeClr val="accent2"/>
+                  </a:solidFill>
+                </a:rPr>
+                <a:t>Limit of detection </a:t>
+              </a:r>
+              <a:endParaRPr lang="ru-RU" sz="1100" dirty="0">
+                <a:solidFill>
+                  <a:schemeClr val="accent2"/>
+                </a:solidFill>
+              </a:endParaRPr>
+            </a:p>
+          </p:txBody>
+        </p:sp>
+        <p:cxnSp>
+          <p:nvCxnSpPr>
+            <p:cNvPr id="21" name="Straight Arrow Connector 20">
+              <a:extLst>
+                <a:ext uri="{FF2B5EF4-FFF2-40B4-BE49-F238E27FC236}">
+                  <a16:creationId xmlns:a16="http://schemas.microsoft.com/office/drawing/2014/main" id="{9A7CED88-38B6-438E-9D0E-E1C3699EC0C1}"/>
+                </a:ext>
+              </a:extLst>
+            </p:cNvPr>
+            <p:cNvCxnSpPr/>
+            <p:nvPr/>
+          </p:nvCxnSpPr>
+          <p:spPr>
+            <a:xfrm flipV="1">
+              <a:off x="1018310" y="3298887"/>
+              <a:ext cx="0" cy="256309"/>
+            </a:xfrm>
+            <a:prstGeom prst="straightConnector1">
+              <a:avLst/>
+            </a:prstGeom>
+            <a:ln w="28575">
+              <a:solidFill>
+                <a:schemeClr val="tx1"/>
+              </a:solidFill>
+              <a:tailEnd type="triangle"/>
+            </a:ln>
+          </p:spPr>
+          <p:style>
+            <a:lnRef idx="1">
+              <a:schemeClr val="accent1"/>
+            </a:lnRef>
+            <a:fillRef idx="0">
+              <a:schemeClr val="accent1"/>
+            </a:fillRef>
+            <a:effectRef idx="0">
+              <a:schemeClr val="accent1"/>
+            </a:effectRef>
+            <a:fontRef idx="minor">
+              <a:schemeClr val="tx1"/>
+            </a:fontRef>
+          </p:style>
+        </p:cxnSp>
+        <p:cxnSp>
+          <p:nvCxnSpPr>
+            <p:cNvPr id="22" name="Straight Arrow Connector 21">
+              <a:extLst>
+                <a:ext uri="{FF2B5EF4-FFF2-40B4-BE49-F238E27FC236}">
+                  <a16:creationId xmlns:a16="http://schemas.microsoft.com/office/drawing/2014/main" id="{54AD41B5-FA18-4F23-98E8-0BBF5D0DC0FA}"/>
+                </a:ext>
+              </a:extLst>
+            </p:cNvPr>
+            <p:cNvCxnSpPr/>
+            <p:nvPr/>
+          </p:nvCxnSpPr>
+          <p:spPr>
+            <a:xfrm flipV="1">
+              <a:off x="1061079" y="3301986"/>
+              <a:ext cx="0" cy="256309"/>
+            </a:xfrm>
+            <a:prstGeom prst="straightConnector1">
+              <a:avLst/>
+            </a:prstGeom>
+            <a:ln w="28575">
+              <a:solidFill>
+                <a:srgbClr val="0000FF"/>
+              </a:solidFill>
+              <a:tailEnd type="triangle"/>
+            </a:ln>
+          </p:spPr>
+          <p:style>
+            <a:lnRef idx="1">
+              <a:schemeClr val="accent1"/>
+            </a:lnRef>
+            <a:fillRef idx="0">
+              <a:schemeClr val="accent1"/>
+            </a:fillRef>
+            <a:effectRef idx="0">
+              <a:schemeClr val="accent1"/>
+            </a:effectRef>
+            <a:fontRef idx="minor">
+              <a:schemeClr val="tx1"/>
+            </a:fontRef>
+          </p:style>
+        </p:cxnSp>
+        <p:cxnSp>
+          <p:nvCxnSpPr>
+            <p:cNvPr id="23" name="Straight Arrow Connector 22">
+              <a:extLst>
+                <a:ext uri="{FF2B5EF4-FFF2-40B4-BE49-F238E27FC236}">
+                  <a16:creationId xmlns:a16="http://schemas.microsoft.com/office/drawing/2014/main" id="{3EF1BF3C-8111-4D90-97FF-475A8AB3B629}"/>
+                </a:ext>
+              </a:extLst>
+            </p:cNvPr>
+            <p:cNvCxnSpPr/>
+            <p:nvPr/>
+          </p:nvCxnSpPr>
+          <p:spPr>
+            <a:xfrm flipV="1">
+              <a:off x="1149928" y="3301986"/>
+              <a:ext cx="0" cy="256309"/>
+            </a:xfrm>
+            <a:prstGeom prst="straightConnector1">
+              <a:avLst/>
+            </a:prstGeom>
+            <a:ln w="28575">
+              <a:solidFill>
+                <a:srgbClr val="FF3300"/>
+              </a:solidFill>
+              <a:tailEnd type="triangle"/>
+            </a:ln>
+          </p:spPr>
+          <p:style>
+            <a:lnRef idx="1">
+              <a:schemeClr val="accent1"/>
+            </a:lnRef>
+            <a:fillRef idx="0">
+              <a:schemeClr val="accent1"/>
+            </a:fillRef>
+            <a:effectRef idx="0">
+              <a:schemeClr val="accent1"/>
+            </a:effectRef>
+            <a:fontRef idx="minor">
+              <a:schemeClr val="tx1"/>
+            </a:fontRef>
+          </p:style>
+        </p:cxnSp>
+        <p:cxnSp>
+          <p:nvCxnSpPr>
+            <p:cNvPr id="24" name="Straight Arrow Connector 23">
+              <a:extLst>
+                <a:ext uri="{FF2B5EF4-FFF2-40B4-BE49-F238E27FC236}">
+                  <a16:creationId xmlns:a16="http://schemas.microsoft.com/office/drawing/2014/main" id="{427DE337-7E99-421F-9F14-122C76FD550B}"/>
+                </a:ext>
+              </a:extLst>
+            </p:cNvPr>
+            <p:cNvCxnSpPr/>
+            <p:nvPr/>
+          </p:nvCxnSpPr>
+          <p:spPr>
+            <a:xfrm flipV="1">
+              <a:off x="1309255" y="3300845"/>
+              <a:ext cx="0" cy="256309"/>
+            </a:xfrm>
+            <a:prstGeom prst="straightConnector1">
+              <a:avLst/>
+            </a:prstGeom>
+            <a:ln w="28575">
+              <a:solidFill>
+                <a:srgbClr val="00B050"/>
+              </a:solidFill>
+              <a:tailEnd type="triangle"/>
+            </a:ln>
+          </p:spPr>
+          <p:style>
+            <a:lnRef idx="1">
+              <a:schemeClr val="accent1"/>
+            </a:lnRef>
+            <a:fillRef idx="0">
+              <a:schemeClr val="accent1"/>
+            </a:fillRef>
+            <a:effectRef idx="0">
+              <a:schemeClr val="accent1"/>
+            </a:effectRef>
+            <a:fontRef idx="minor">
+              <a:schemeClr val="tx1"/>
+            </a:fontRef>
+          </p:style>
+        </p:cxnSp>
+        <p:cxnSp>
+          <p:nvCxnSpPr>
+            <p:cNvPr id="25" name="Straight Arrow Connector 24">
+              <a:extLst>
+                <a:ext uri="{FF2B5EF4-FFF2-40B4-BE49-F238E27FC236}">
+                  <a16:creationId xmlns:a16="http://schemas.microsoft.com/office/drawing/2014/main" id="{DE7178CF-0784-4FDD-BD01-15455BF1918B}"/>
+                </a:ext>
+              </a:extLst>
+            </p:cNvPr>
+            <p:cNvCxnSpPr/>
+            <p:nvPr/>
+          </p:nvCxnSpPr>
+          <p:spPr>
+            <a:xfrm flipV="1">
+              <a:off x="1614055" y="3300844"/>
+              <a:ext cx="0" cy="256309"/>
+            </a:xfrm>
+            <a:prstGeom prst="straightConnector1">
+              <a:avLst/>
+            </a:prstGeom>
+            <a:ln w="28575">
+              <a:solidFill>
+                <a:srgbClr val="FF33CC"/>
+              </a:solidFill>
+              <a:tailEnd type="triangle"/>
+            </a:ln>
+          </p:spPr>
+          <p:style>
+            <a:lnRef idx="1">
+              <a:schemeClr val="accent1"/>
+            </a:lnRef>
+            <a:fillRef idx="0">
+              <a:schemeClr val="accent1"/>
+            </a:fillRef>
+            <a:effectRef idx="0">
+              <a:schemeClr val="accent1"/>
+            </a:effectRef>
+            <a:fontRef idx="minor">
+              <a:schemeClr val="tx1"/>
+            </a:fontRef>
+          </p:style>
+        </p:cxnSp>
+        <p:cxnSp>
+          <p:nvCxnSpPr>
+            <p:cNvPr id="26" name="Straight Arrow Connector 25">
+              <a:extLst>
+                <a:ext uri="{FF2B5EF4-FFF2-40B4-BE49-F238E27FC236}">
+                  <a16:creationId xmlns:a16="http://schemas.microsoft.com/office/drawing/2014/main" id="{6765132D-10BB-4AD2-AC1E-420900F181EA}"/>
+                </a:ext>
+              </a:extLst>
+            </p:cNvPr>
+            <p:cNvCxnSpPr/>
+            <p:nvPr/>
+          </p:nvCxnSpPr>
+          <p:spPr>
+            <a:xfrm flipV="1">
+              <a:off x="2244436" y="3300844"/>
+              <a:ext cx="0" cy="256309"/>
+            </a:xfrm>
+            <a:prstGeom prst="straightConnector1">
+              <a:avLst/>
+            </a:prstGeom>
+            <a:ln w="28575">
+              <a:solidFill>
+                <a:srgbClr val="808000"/>
+              </a:solidFill>
+              <a:tailEnd type="triangle"/>
+            </a:ln>
+          </p:spPr>
+          <p:style>
+            <a:lnRef idx="1">
+              <a:schemeClr val="accent1"/>
+            </a:lnRef>
+            <a:fillRef idx="0">
+              <a:schemeClr val="accent1"/>
+            </a:fillRef>
+            <a:effectRef idx="0">
+              <a:schemeClr val="accent1"/>
+            </a:effectRef>
+            <a:fontRef idx="minor">
+              <a:schemeClr val="tx1"/>
+            </a:fontRef>
+          </p:style>
+        </p:cxnSp>
+        <p:cxnSp>
+          <p:nvCxnSpPr>
+            <p:cNvPr id="32" name="Straight Arrow Connector 31">
+              <a:extLst>
+                <a:ext uri="{FF2B5EF4-FFF2-40B4-BE49-F238E27FC236}">
+                  <a16:creationId xmlns:a16="http://schemas.microsoft.com/office/drawing/2014/main" id="{B5C4D11D-9966-4ED1-9339-DE1CF64DC85B}"/>
+                </a:ext>
+              </a:extLst>
+            </p:cNvPr>
+            <p:cNvCxnSpPr>
+              <a:cxnSpLocks/>
+            </p:cNvCxnSpPr>
+            <p:nvPr/>
+          </p:nvCxnSpPr>
+          <p:spPr>
+            <a:xfrm>
+              <a:off x="1018308" y="5478207"/>
+              <a:ext cx="0" cy="256309"/>
+            </a:xfrm>
+            <a:prstGeom prst="straightConnector1">
+              <a:avLst/>
+            </a:prstGeom>
+            <a:ln w="28575">
+              <a:solidFill>
+                <a:schemeClr val="tx1"/>
+              </a:solidFill>
+              <a:tailEnd type="triangle"/>
+            </a:ln>
+          </p:spPr>
+          <p:style>
+            <a:lnRef idx="1">
+              <a:schemeClr val="accent1"/>
+            </a:lnRef>
+            <a:fillRef idx="0">
+              <a:schemeClr val="accent1"/>
+            </a:fillRef>
+            <a:effectRef idx="0">
+              <a:schemeClr val="accent1"/>
+            </a:effectRef>
+            <a:fontRef idx="minor">
+              <a:schemeClr val="tx1"/>
+            </a:fontRef>
+          </p:style>
+        </p:cxnSp>
+        <p:cxnSp>
+          <p:nvCxnSpPr>
+            <p:cNvPr id="33" name="Straight Arrow Connector 32">
+              <a:extLst>
+                <a:ext uri="{FF2B5EF4-FFF2-40B4-BE49-F238E27FC236}">
+                  <a16:creationId xmlns:a16="http://schemas.microsoft.com/office/drawing/2014/main" id="{38EFB9D2-A8ED-4AAB-8C76-A7AA5A00125D}"/>
+                </a:ext>
+              </a:extLst>
+            </p:cNvPr>
+            <p:cNvCxnSpPr>
+              <a:cxnSpLocks/>
+            </p:cNvCxnSpPr>
+            <p:nvPr/>
+          </p:nvCxnSpPr>
+          <p:spPr>
+            <a:xfrm>
+              <a:off x="1061077" y="5481306"/>
+              <a:ext cx="0" cy="256309"/>
+            </a:xfrm>
+            <a:prstGeom prst="straightConnector1">
+              <a:avLst/>
+            </a:prstGeom>
+            <a:ln w="28575">
+              <a:solidFill>
+                <a:srgbClr val="0000FF"/>
+              </a:solidFill>
+              <a:tailEnd type="triangle"/>
+            </a:ln>
+          </p:spPr>
+          <p:style>
+            <a:lnRef idx="1">
+              <a:schemeClr val="accent1"/>
+            </a:lnRef>
+            <a:fillRef idx="0">
+              <a:schemeClr val="accent1"/>
+            </a:fillRef>
+            <a:effectRef idx="0">
+              <a:schemeClr val="accent1"/>
+            </a:effectRef>
+            <a:fontRef idx="minor">
+              <a:schemeClr val="tx1"/>
+            </a:fontRef>
+          </p:style>
+        </p:cxnSp>
+        <p:cxnSp>
+          <p:nvCxnSpPr>
+            <p:cNvPr id="34" name="Straight Arrow Connector 33">
+              <a:extLst>
+                <a:ext uri="{FF2B5EF4-FFF2-40B4-BE49-F238E27FC236}">
+                  <a16:creationId xmlns:a16="http://schemas.microsoft.com/office/drawing/2014/main" id="{DC7D1DEA-40AF-4E63-8DC2-36B78AB2DCBE}"/>
+                </a:ext>
+              </a:extLst>
+            </p:cNvPr>
+            <p:cNvCxnSpPr>
+              <a:cxnSpLocks/>
+            </p:cNvCxnSpPr>
+            <p:nvPr/>
+          </p:nvCxnSpPr>
+          <p:spPr>
+            <a:xfrm>
+              <a:off x="1149926" y="5392914"/>
+              <a:ext cx="0" cy="256309"/>
+            </a:xfrm>
+            <a:prstGeom prst="straightConnector1">
+              <a:avLst/>
+            </a:prstGeom>
+            <a:ln w="28575">
+              <a:solidFill>
+                <a:srgbClr val="FF3300"/>
+              </a:solidFill>
+              <a:tailEnd type="triangle"/>
+            </a:ln>
+          </p:spPr>
+          <p:style>
+            <a:lnRef idx="1">
+              <a:schemeClr val="accent1"/>
+            </a:lnRef>
+            <a:fillRef idx="0">
+              <a:schemeClr val="accent1"/>
+            </a:fillRef>
+            <a:effectRef idx="0">
+              <a:schemeClr val="accent1"/>
+            </a:effectRef>
+            <a:fontRef idx="minor">
+              <a:schemeClr val="tx1"/>
+            </a:fontRef>
+          </p:style>
+        </p:cxnSp>
+        <p:cxnSp>
+          <p:nvCxnSpPr>
+            <p:cNvPr id="35" name="Straight Arrow Connector 34">
+              <a:extLst>
+                <a:ext uri="{FF2B5EF4-FFF2-40B4-BE49-F238E27FC236}">
+                  <a16:creationId xmlns:a16="http://schemas.microsoft.com/office/drawing/2014/main" id="{9E73319B-2C39-47E7-9C39-856B847425F1}"/>
+                </a:ext>
+              </a:extLst>
+            </p:cNvPr>
+            <p:cNvCxnSpPr>
+              <a:cxnSpLocks/>
+            </p:cNvCxnSpPr>
+            <p:nvPr/>
+          </p:nvCxnSpPr>
+          <p:spPr>
+            <a:xfrm>
+              <a:off x="1309253" y="5166221"/>
+              <a:ext cx="0" cy="256309"/>
+            </a:xfrm>
+            <a:prstGeom prst="straightConnector1">
+              <a:avLst/>
+            </a:prstGeom>
+            <a:ln w="28575">
+              <a:solidFill>
+                <a:srgbClr val="00B050"/>
+              </a:solidFill>
+              <a:tailEnd type="triangle"/>
+            </a:ln>
+          </p:spPr>
+          <p:style>
+            <a:lnRef idx="1">
+              <a:schemeClr val="accent1"/>
+            </a:lnRef>
+            <a:fillRef idx="0">
+              <a:schemeClr val="accent1"/>
+            </a:fillRef>
+            <a:effectRef idx="0">
+              <a:schemeClr val="accent1"/>
+            </a:effectRef>
+            <a:fontRef idx="minor">
+              <a:schemeClr val="tx1"/>
+            </a:fontRef>
+          </p:style>
+        </p:cxnSp>
+        <p:cxnSp>
+          <p:nvCxnSpPr>
+            <p:cNvPr id="36" name="Straight Arrow Connector 35">
+              <a:extLst>
+                <a:ext uri="{FF2B5EF4-FFF2-40B4-BE49-F238E27FC236}">
+                  <a16:creationId xmlns:a16="http://schemas.microsoft.com/office/drawing/2014/main" id="{90877D9D-0898-42AE-9840-FBC88C72AED2}"/>
+                </a:ext>
+              </a:extLst>
+            </p:cNvPr>
+            <p:cNvCxnSpPr>
+              <a:cxnSpLocks/>
+            </p:cNvCxnSpPr>
+            <p:nvPr/>
+          </p:nvCxnSpPr>
+          <p:spPr>
+            <a:xfrm>
+              <a:off x="1614053" y="4574908"/>
+              <a:ext cx="0" cy="256309"/>
+            </a:xfrm>
+            <a:prstGeom prst="straightConnector1">
+              <a:avLst/>
+            </a:prstGeom>
+            <a:ln w="28575">
+              <a:solidFill>
+                <a:srgbClr val="FF33CC"/>
+              </a:solidFill>
+              <a:tailEnd type="triangle"/>
+            </a:ln>
+          </p:spPr>
+          <p:style>
+            <a:lnRef idx="1">
+              <a:schemeClr val="accent1"/>
+            </a:lnRef>
+            <a:fillRef idx="0">
+              <a:schemeClr val="accent1"/>
+            </a:fillRef>
+            <a:effectRef idx="0">
+              <a:schemeClr val="accent1"/>
+            </a:effectRef>
+            <a:fontRef idx="minor">
+              <a:schemeClr val="tx1"/>
+            </a:fontRef>
+          </p:style>
+        </p:cxnSp>
+        <p:cxnSp>
+          <p:nvCxnSpPr>
+            <p:cNvPr id="37" name="Straight Arrow Connector 36">
+              <a:extLst>
+                <a:ext uri="{FF2B5EF4-FFF2-40B4-BE49-F238E27FC236}">
+                  <a16:creationId xmlns:a16="http://schemas.microsoft.com/office/drawing/2014/main" id="{F6BAE4D6-973F-40C3-8D34-8131D183A45B}"/>
+                </a:ext>
+              </a:extLst>
+            </p:cNvPr>
+            <p:cNvCxnSpPr>
+              <a:cxnSpLocks/>
+            </p:cNvCxnSpPr>
+            <p:nvPr/>
+          </p:nvCxnSpPr>
+          <p:spPr>
+            <a:xfrm>
+              <a:off x="2244434" y="3361296"/>
+              <a:ext cx="0" cy="256309"/>
+            </a:xfrm>
+            <a:prstGeom prst="straightConnector1">
+              <a:avLst/>
+            </a:prstGeom>
+            <a:ln w="28575">
+              <a:solidFill>
+                <a:srgbClr val="808000"/>
+              </a:solidFill>
+              <a:tailEnd type="triangle"/>
+            </a:ln>
+          </p:spPr>
+          <p:style>
+            <a:lnRef idx="1">
+              <a:schemeClr val="accent1"/>
+            </a:lnRef>
+            <a:fillRef idx="0">
+              <a:schemeClr val="accent1"/>
+            </a:fillRef>
+            <a:effectRef idx="0">
+              <a:schemeClr val="accent1"/>
+            </a:effectRef>
+            <a:fontRef idx="minor">
+              <a:schemeClr val="tx1"/>
+            </a:fontRef>
+          </p:style>
+        </p:cxnSp>
+        <p:sp>
+          <p:nvSpPr>
+            <p:cNvPr id="38" name="TextBox 37">
+              <a:extLst>
+                <a:ext uri="{FF2B5EF4-FFF2-40B4-BE49-F238E27FC236}">
+                  <a16:creationId xmlns:a16="http://schemas.microsoft.com/office/drawing/2014/main" id="{75C29D6A-5A4D-4D13-B6FF-81ECC3BCB315}"/>
+                </a:ext>
+              </a:extLst>
+            </p:cNvPr>
+            <p:cNvSpPr txBox="1"/>
+            <p:nvPr/>
+          </p:nvSpPr>
+          <p:spPr>
+            <a:xfrm>
+              <a:off x="4183585" y="1457017"/>
+              <a:ext cx="2533790" cy="1600438"/>
+            </a:xfrm>
+            <a:prstGeom prst="rect">
+              <a:avLst/>
+            </a:prstGeom>
+            <a:noFill/>
+          </p:spPr>
+          <p:txBody>
+            <a:bodyPr wrap="square" rtlCol="0">
+              <a:spAutoFit/>
+            </a:bodyPr>
+            <a:lstStyle/>
+            <a:p>
+              <a:r>
+                <a:rPr lang="en-US" sz="1400" b="1" dirty="0"/>
+                <a:t>Time of IR switching ON: </a:t>
+              </a:r>
+            </a:p>
+            <a:p>
+              <a:r>
+                <a:rPr lang="en-US" sz="1400" b="1" dirty="0"/>
+                <a:t>10 hour</a:t>
+              </a:r>
+            </a:p>
+            <a:p>
+              <a:r>
+                <a:rPr lang="en-US" sz="1400" b="1" dirty="0">
+                  <a:solidFill>
+                    <a:srgbClr val="0000FF"/>
+                  </a:solidFill>
+                </a:rPr>
+                <a:t>20 hour</a:t>
+              </a:r>
+            </a:p>
+            <a:p>
+              <a:r>
+                <a:rPr lang="en-US" sz="1400" b="1" dirty="0">
+                  <a:solidFill>
+                    <a:srgbClr val="FF0000"/>
+                  </a:solidFill>
+                </a:rPr>
+                <a:t>40 hour</a:t>
+              </a:r>
+            </a:p>
+            <a:p>
+              <a:r>
+                <a:rPr lang="en-US" sz="1400" b="1" dirty="0">
+                  <a:solidFill>
+                    <a:srgbClr val="00B050"/>
+                  </a:solidFill>
+                </a:rPr>
+                <a:t>80 hour</a:t>
+              </a:r>
+            </a:p>
+            <a:p>
+              <a:r>
+                <a:rPr lang="en-US" sz="1400" b="1" dirty="0">
+                  <a:solidFill>
+                    <a:srgbClr val="FF33CC"/>
+                  </a:solidFill>
+                </a:rPr>
+                <a:t>160 hour</a:t>
+              </a:r>
+            </a:p>
+            <a:p>
+              <a:r>
+                <a:rPr lang="en-US" sz="1400" b="1" dirty="0">
+                  <a:solidFill>
+                    <a:srgbClr val="808000"/>
+                  </a:solidFill>
+                </a:rPr>
+                <a:t>320 hour</a:t>
+              </a:r>
+              <a:endParaRPr lang="ru-RU" sz="1400" b="1" dirty="0">
+                <a:solidFill>
+                  <a:srgbClr val="808000"/>
+                </a:solidFill>
+              </a:endParaRPr>
+            </a:p>
+          </p:txBody>
+        </p:sp>
+      </p:grpSp>
+    </p:spTree>
+    <p:extLst>
+      <p:ext uri="{BB962C8B-B14F-4D97-AF65-F5344CB8AC3E}">
+        <p14:creationId xmlns:p14="http://schemas.microsoft.com/office/powerpoint/2010/main" val="688910892"/>
+      </p:ext>
+    </p:extLst>
+  </p:cSld>
+  <p:clrMapOvr>
+    <a:masterClrMapping/>
+  </p:clrMapOvr>
+</p:sld>
+</file>
+
+<file path=ppt/slides/slide22.xml><?xml version="1.0" encoding="utf-8"?>
+<p:sld xmlns:a="http://schemas.openxmlformats.org/drawingml/2006/main" xmlns:r="http://schemas.openxmlformats.org/officeDocument/2006/relationships" xmlns:p="http://schemas.openxmlformats.org/presentationml/2006/main">
+  <p:cSld>
+    <p:spTree>
+      <p:nvGrpSpPr>
+        <p:cNvPr id="1" name=""/>
+        <p:cNvGrpSpPr/>
+        <p:nvPr/>
+      </p:nvGrpSpPr>
+      <p:grpSpPr>
+        <a:xfrm>
+          <a:off x="0" y="0"/>
+          <a:ext cx="0" cy="0"/>
+          <a:chOff x="0" y="0"/>
+          <a:chExt cx="0" cy="0"/>
+        </a:xfrm>
+      </p:grpSpPr>
+      <p:sp>
+        <p:nvSpPr>
+          <p:cNvPr id="2" name="Slide Number Placeholder 1">
+            <a:extLst>
+              <a:ext uri="{FF2B5EF4-FFF2-40B4-BE49-F238E27FC236}">
+                <a16:creationId xmlns:a16="http://schemas.microsoft.com/office/drawing/2014/main" id="{AA6CEFC3-35E4-46AB-8178-6CE9EA81C1D9}"/>
+              </a:ext>
+            </a:extLst>
+          </p:cNvPr>
+          <p:cNvSpPr>
+            <a:spLocks noGrp="1"/>
+          </p:cNvSpPr>
+          <p:nvPr>
+            <p:ph type="sldNum" sz="quarter" idx="12"/>
+          </p:nvPr>
+        </p:nvSpPr>
+        <p:spPr/>
+        <p:txBody>
+          <a:bodyPr/>
+          <a:lstStyle/>
+          <a:p>
+            <a:fld id="{8D0E1ED9-1B5C-4060-9004-48CB920062D4}" type="slidenum">
+              <a:rPr lang="ru-RU" smtClean="0"/>
+              <a:pPr/>
+              <a:t>22</a:t>
+            </a:fld>
+            <a:endParaRPr lang="ru-RU"/>
+          </a:p>
+        </p:txBody>
+      </p:sp>
+    </p:spTree>
+    <p:extLst>
+      <p:ext uri="{BB962C8B-B14F-4D97-AF65-F5344CB8AC3E}">
         <p14:creationId xmlns:p14="http://schemas.microsoft.com/office/powerpoint/2010/main" val="3869420338"/>
       </p:ext>
     </p:extLst>
@@ -17143,7 +20141,7 @@
 </p:sld>
 </file>
 
-<file path=ppt/slides/slide18.xml><?xml version="1.0" encoding="utf-8"?>
+<file path=ppt/slides/slide23.xml><?xml version="1.0" encoding="utf-8"?>
 <p:sld xmlns:a="http://schemas.openxmlformats.org/drawingml/2006/main" xmlns:r="http://schemas.openxmlformats.org/officeDocument/2006/relationships" xmlns:p="http://schemas.openxmlformats.org/presentationml/2006/main">
   <p:cSld>
     <p:spTree>
@@ -17215,7 +20213,7 @@
             <a:fld id="{8D0E1ED9-1B5C-4060-9004-48CB920062D4}" type="slidenum">
               <a:rPr lang="ru-RU" smtClean="0"/>
               <a:pPr/>
-              <a:t>18</a:t>
+              <a:t>23</a:t>
             </a:fld>
             <a:endParaRPr lang="ru-RU"/>
           </a:p>
@@ -17670,7 +20668,7 @@
 </p:sld>
 </file>
 
-<file path=ppt/slides/slide19.xml><?xml version="1.0" encoding="utf-8"?>
+<file path=ppt/slides/slide24.xml><?xml version="1.0" encoding="utf-8"?>
 <p:sld xmlns:a="http://schemas.openxmlformats.org/drawingml/2006/main" xmlns:r="http://schemas.openxmlformats.org/officeDocument/2006/relationships" xmlns:p="http://schemas.openxmlformats.org/presentationml/2006/main">
   <p:cSld>
     <p:spTree>
@@ -17913,7 +20911,7 @@
 </p:sld>
 </file>
 
-<file path=ppt/slides/slide2.xml><?xml version="1.0" encoding="utf-8"?>
+<file path=ppt/slides/slide25.xml><?xml version="1.0" encoding="utf-8"?>
 <p:sld xmlns:a="http://schemas.openxmlformats.org/drawingml/2006/main" xmlns:r="http://schemas.openxmlformats.org/officeDocument/2006/relationships" xmlns:p="http://schemas.openxmlformats.org/presentationml/2006/main">
   <p:cSld>
     <p:spTree>
@@ -17935,7 +20933,7 @@
           <p:cNvPr id="2" name="Title 1">
             <a:extLst>
               <a:ext uri="{FF2B5EF4-FFF2-40B4-BE49-F238E27FC236}">
-                <a16:creationId xmlns:a16="http://schemas.microsoft.com/office/drawing/2014/main" id="{06409FCD-A934-497E-8A5A-D566EBF17CDC}"/>
+                <a16:creationId xmlns:a16="http://schemas.microsoft.com/office/drawing/2014/main" id="{DB1F0EDD-A17D-4CBE-9ABF-547DC9B5BF70}"/>
               </a:ext>
             </a:extLst>
           </p:cNvPr>
@@ -17946,96 +20944,32 @@
             <p:ph type="title"/>
           </p:nvPr>
         </p:nvSpPr>
-        <p:spPr/>
+        <p:spPr>
+          <a:xfrm>
+            <a:off x="412519" y="14580"/>
+            <a:ext cx="8324156" cy="507710"/>
+          </a:xfrm>
+        </p:spPr>
         <p:txBody>
           <a:bodyPr>
-            <a:normAutofit/>
+            <a:noAutofit/>
           </a:bodyPr>
           <a:lstStyle/>
           <a:p>
             <a:r>
-              <a:rPr lang="en-US" sz="2800" dirty="0"/>
-              <a:t>Commit date: 26.05.12</a:t>
+              <a:rPr lang="en-US" sz="2000" dirty="0"/>
+              <a:t>Model simulations: Effect of delay in Immune Response on viral load</a:t>
             </a:r>
-            <a:br>
-              <a:rPr lang="en-US" sz="2800" dirty="0"/>
-            </a:br>
-            <a:br>
-              <a:rPr lang="en-US" sz="2800" dirty="0"/>
-            </a:br>
-            <a:r>
-              <a:rPr lang="en-US" sz="2800" dirty="0"/>
-              <a:t>Commit name: updated version (VL_v0.1.1) of SARS-CoV-2 viral dynamics model </a:t>
-            </a:r>
-            <a:endParaRPr lang="ru-RU" sz="2800" dirty="0"/>
+            <a:endParaRPr lang="ru-RU" sz="2000" dirty="0"/>
           </a:p>
         </p:txBody>
       </p:sp>
       <p:sp>
         <p:nvSpPr>
-          <p:cNvPr id="3" name="Text Placeholder 2">
+          <p:cNvPr id="3" name="Slide Number Placeholder 2">
             <a:extLst>
               <a:ext uri="{FF2B5EF4-FFF2-40B4-BE49-F238E27FC236}">
-                <a16:creationId xmlns:a16="http://schemas.microsoft.com/office/drawing/2014/main" id="{C33FC260-48D1-4607-9B82-D2CD2E577DB2}"/>
-              </a:ext>
-            </a:extLst>
-          </p:cNvPr>
-          <p:cNvSpPr>
-            <a:spLocks noGrp="1"/>
-          </p:cNvSpPr>
-          <p:nvPr>
-            <p:ph type="body" idx="1"/>
-          </p:nvPr>
-        </p:nvSpPr>
-        <p:spPr/>
-        <p:txBody>
-          <a:bodyPr>
-            <a:normAutofit fontScale="85000" lnSpcReduction="20000"/>
-          </a:bodyPr>
-          <a:lstStyle/>
-          <a:p>
-            <a:r>
-              <a:rPr lang="en-US" dirty="0"/>
-              <a:t>Aims: </a:t>
-            </a:r>
-          </a:p>
-          <a:p>
-            <a:pPr marL="342900" indent="-342900">
-              <a:buFont typeface="Arial" panose="020B0604020202020204" pitchFamily="34" charset="0"/>
-              <a:buChar char="•"/>
-            </a:pPr>
-            <a:r>
-              <a:rPr lang="en-US" dirty="0"/>
-              <a:t>To introduce limitation in number of virions able to bind to PCII cell to avoid non-physiological accumulation of (</a:t>
-            </a:r>
-            <a:r>
-              <a:rPr lang="en-US" dirty="0" err="1"/>
-              <a:t>i</a:t>
-            </a:r>
-            <a:r>
-              <a:rPr lang="en-US" dirty="0"/>
-              <a:t>) the virions on the cell surface and (ii) virus RNA in nucleus</a:t>
-            </a:r>
-          </a:p>
-          <a:p>
-            <a:pPr marL="342900" indent="-342900">
-              <a:buFont typeface="Arial" panose="020B0604020202020204" pitchFamily="34" charset="0"/>
-              <a:buChar char="•"/>
-            </a:pPr>
-            <a:r>
-              <a:rPr lang="en-US" dirty="0"/>
-              <a:t>Reproduction of clinical data on virus load dynamics</a:t>
-            </a:r>
-            <a:endParaRPr lang="ru-RU" dirty="0"/>
-          </a:p>
-        </p:txBody>
-      </p:sp>
-      <p:sp>
-        <p:nvSpPr>
-          <p:cNvPr id="4" name="Slide Number Placeholder 3">
-            <a:extLst>
-              <a:ext uri="{FF2B5EF4-FFF2-40B4-BE49-F238E27FC236}">
-                <a16:creationId xmlns:a16="http://schemas.microsoft.com/office/drawing/2014/main" id="{B5E3C9EE-DEA7-4EF1-8145-1DF3D9BCBA61}"/>
+                <a16:creationId xmlns:a16="http://schemas.microsoft.com/office/drawing/2014/main" id="{B024B872-507A-4C79-B75E-90137F5363F8}"/>
               </a:ext>
             </a:extLst>
           </p:cNvPr>
@@ -18054,16 +20988,621 @@
             <a:fld id="{8D0E1ED9-1B5C-4060-9004-48CB920062D4}" type="slidenum">
               <a:rPr lang="ru-RU" smtClean="0"/>
               <a:pPr/>
-              <a:t>2</a:t>
+              <a:t>25</a:t>
             </a:fld>
             <a:endParaRPr lang="ru-RU"/>
+          </a:p>
+        </p:txBody>
+      </p:sp>
+      <p:pic>
+        <p:nvPicPr>
+          <p:cNvPr id="5" name="Picture 4">
+            <a:extLst>
+              <a:ext uri="{FF2B5EF4-FFF2-40B4-BE49-F238E27FC236}">
+                <a16:creationId xmlns:a16="http://schemas.microsoft.com/office/drawing/2014/main" id="{A45E7B72-82E1-4A2D-ACBE-99FB3D92D295}"/>
+              </a:ext>
+            </a:extLst>
+          </p:cNvPr>
+          <p:cNvPicPr>
+            <a:picLocks noChangeAspect="1"/>
+          </p:cNvPicPr>
+          <p:nvPr/>
+        </p:nvPicPr>
+        <p:blipFill>
+          <a:blip r:embed="rId2"/>
+          <a:stretch>
+            <a:fillRect/>
+          </a:stretch>
+        </p:blipFill>
+        <p:spPr>
+          <a:xfrm>
+            <a:off x="195321" y="494296"/>
+            <a:ext cx="6552470" cy="5087007"/>
+          </a:xfrm>
+          <a:prstGeom prst="rect">
+            <a:avLst/>
+          </a:prstGeom>
+        </p:spPr>
+      </p:pic>
+      <p:sp>
+        <p:nvSpPr>
+          <p:cNvPr id="39" name="TextBox 38">
+            <a:extLst>
+              <a:ext uri="{FF2B5EF4-FFF2-40B4-BE49-F238E27FC236}">
+                <a16:creationId xmlns:a16="http://schemas.microsoft.com/office/drawing/2014/main" id="{8D7D1452-A17A-4E27-ADEF-6EEEECF28192}"/>
+              </a:ext>
+            </a:extLst>
+          </p:cNvPr>
+          <p:cNvSpPr txBox="1"/>
+          <p:nvPr/>
+        </p:nvSpPr>
+        <p:spPr>
+          <a:xfrm>
+            <a:off x="0" y="5557177"/>
+            <a:ext cx="9144000" cy="1138773"/>
+          </a:xfrm>
+          <a:prstGeom prst="rect">
+            <a:avLst/>
+          </a:prstGeom>
+          <a:solidFill>
+            <a:schemeClr val="bg1"/>
+          </a:solidFill>
+        </p:spPr>
+        <p:txBody>
+          <a:bodyPr wrap="square" rtlCol="0">
+            <a:spAutoFit/>
+          </a:bodyPr>
+          <a:lstStyle/>
+          <a:p>
+            <a:r>
+              <a:rPr lang="en-US" sz="2000" dirty="0">
+                <a:latin typeface="+mj-lt"/>
+              </a:rPr>
+              <a:t>RESULTS: </a:t>
+            </a:r>
+          </a:p>
+          <a:p>
+            <a:pPr marL="285750" indent="-285750">
+              <a:buFont typeface="Arial" panose="020B0604020202020204" pitchFamily="34" charset="0"/>
+              <a:buChar char="•"/>
+            </a:pPr>
+            <a:r>
+              <a:rPr lang="en-US" sz="1600" dirty="0"/>
+              <a:t>Early IR (10 and </a:t>
+            </a:r>
+            <a:r>
+              <a:rPr lang="en-US" sz="1600" dirty="0">
+                <a:solidFill>
+                  <a:srgbClr val="0000FF"/>
+                </a:solidFill>
+              </a:rPr>
+              <a:t>20</a:t>
+            </a:r>
+            <a:r>
+              <a:rPr lang="en-US" sz="1600" dirty="0"/>
+              <a:t> hours) do not allow to detect virus in sputum at any time. </a:t>
+            </a:r>
+          </a:p>
+          <a:p>
+            <a:pPr marL="285750" indent="-285750">
+              <a:buFont typeface="Arial" panose="020B0604020202020204" pitchFamily="34" charset="0"/>
+              <a:buChar char="•"/>
+            </a:pPr>
+            <a:r>
+              <a:rPr lang="en-US" sz="1600" dirty="0"/>
+              <a:t>Delay in IR start substantially increases peak viral load and shifts the peak to later time</a:t>
+            </a:r>
+          </a:p>
+          <a:p>
+            <a:pPr marL="285750" indent="-285750">
+              <a:buFont typeface="Arial" panose="020B0604020202020204" pitchFamily="34" charset="0"/>
+              <a:buChar char="•"/>
+            </a:pPr>
+            <a:r>
+              <a:rPr lang="en-US" sz="1600" dirty="0"/>
+              <a:t>Very late IR start leads to plateau in viral load dynamics with maximal viral load value</a:t>
+            </a:r>
+            <a:endParaRPr lang="ru-RU" sz="1600" dirty="0"/>
+          </a:p>
+        </p:txBody>
+      </p:sp>
+      <p:sp>
+        <p:nvSpPr>
+          <p:cNvPr id="40" name="TextBox 39">
+            <a:extLst>
+              <a:ext uri="{FF2B5EF4-FFF2-40B4-BE49-F238E27FC236}">
+                <a16:creationId xmlns:a16="http://schemas.microsoft.com/office/drawing/2014/main" id="{7464A271-210F-4C68-BAAA-3C1E89771FBA}"/>
+              </a:ext>
+            </a:extLst>
+          </p:cNvPr>
+          <p:cNvSpPr txBox="1"/>
+          <p:nvPr/>
+        </p:nvSpPr>
+        <p:spPr>
+          <a:xfrm>
+            <a:off x="6822435" y="1403463"/>
+            <a:ext cx="2293573" cy="3354765"/>
+          </a:xfrm>
+          <a:prstGeom prst="rect">
+            <a:avLst/>
+          </a:prstGeom>
+          <a:noFill/>
+        </p:spPr>
+        <p:txBody>
+          <a:bodyPr wrap="square" rtlCol="0">
+            <a:spAutoFit/>
+          </a:bodyPr>
+          <a:lstStyle/>
+          <a:p>
+            <a:r>
+              <a:rPr lang="en-US" sz="1600" dirty="0"/>
+              <a:t>SIMULATION DESIGN: </a:t>
+            </a:r>
+          </a:p>
+          <a:p>
+            <a:pPr marL="285750" indent="-285750">
+              <a:buFont typeface="Arial" panose="020B0604020202020204" pitchFamily="34" charset="0"/>
+              <a:buChar char="•"/>
+            </a:pPr>
+            <a:r>
+              <a:rPr lang="en-US" sz="1400" dirty="0"/>
+              <a:t>Start time of Immune response (IR) was varied from 10 to 320 hours past infection. </a:t>
+            </a:r>
+          </a:p>
+          <a:p>
+            <a:pPr marL="285750" indent="-285750">
+              <a:buFont typeface="Arial" panose="020B0604020202020204" pitchFamily="34" charset="0"/>
+              <a:buChar char="•"/>
+            </a:pPr>
+            <a:r>
+              <a:rPr lang="en-US" sz="1400" dirty="0"/>
+              <a:t>Amplitude of IR and virus initial concentration in sputum were kept the same for various start time</a:t>
+            </a:r>
+          </a:p>
+          <a:p>
+            <a:pPr marL="285750" indent="-285750">
+              <a:buFont typeface="Arial" panose="020B0604020202020204" pitchFamily="34" charset="0"/>
+              <a:buChar char="•"/>
+            </a:pPr>
+            <a:r>
+              <a:rPr lang="en-US" sz="1400" dirty="0"/>
+              <a:t>At each start time viral load dynamics in sputum was simulated</a:t>
+            </a:r>
+          </a:p>
+          <a:p>
+            <a:pPr marL="285750" indent="-285750">
+              <a:buFont typeface="Arial" panose="020B0604020202020204" pitchFamily="34" charset="0"/>
+              <a:buChar char="•"/>
+            </a:pPr>
+            <a:endParaRPr lang="en-US" sz="1400" dirty="0"/>
           </a:p>
         </p:txBody>
       </p:sp>
     </p:spTree>
     <p:extLst>
       <p:ext uri="{BB962C8B-B14F-4D97-AF65-F5344CB8AC3E}">
-        <p14:creationId xmlns:p14="http://schemas.microsoft.com/office/powerpoint/2010/main" val="2704732925"/>
+        <p14:creationId xmlns:p14="http://schemas.microsoft.com/office/powerpoint/2010/main" val="1460626149"/>
+      </p:ext>
+    </p:extLst>
+  </p:cSld>
+  <p:clrMapOvr>
+    <a:masterClrMapping/>
+  </p:clrMapOvr>
+</p:sld>
+</file>
+
+<file path=ppt/slides/slide26.xml><?xml version="1.0" encoding="utf-8"?>
+<p:sld xmlns:a="http://schemas.openxmlformats.org/drawingml/2006/main" xmlns:r="http://schemas.openxmlformats.org/officeDocument/2006/relationships" xmlns:p="http://schemas.openxmlformats.org/presentationml/2006/main">
+  <p:cSld>
+    <p:spTree>
+      <p:nvGrpSpPr>
+        <p:cNvPr id="1" name=""/>
+        <p:cNvGrpSpPr/>
+        <p:nvPr/>
+      </p:nvGrpSpPr>
+      <p:grpSpPr>
+        <a:xfrm>
+          <a:off x="0" y="0"/>
+          <a:ext cx="0" cy="0"/>
+          <a:chOff x="0" y="0"/>
+          <a:chExt cx="0" cy="0"/>
+        </a:xfrm>
+      </p:grpSpPr>
+      <p:sp>
+        <p:nvSpPr>
+          <p:cNvPr id="2" name="Title 1">
+            <a:extLst>
+              <a:ext uri="{FF2B5EF4-FFF2-40B4-BE49-F238E27FC236}">
+                <a16:creationId xmlns:a16="http://schemas.microsoft.com/office/drawing/2014/main" id="{DB1F0EDD-A17D-4CBE-9ABF-547DC9B5BF70}"/>
+              </a:ext>
+            </a:extLst>
+          </p:cNvPr>
+          <p:cNvSpPr>
+            <a:spLocks noGrp="1"/>
+          </p:cNvSpPr>
+          <p:nvPr>
+            <p:ph type="title"/>
+          </p:nvPr>
+        </p:nvSpPr>
+        <p:spPr>
+          <a:xfrm>
+            <a:off x="412519" y="14580"/>
+            <a:ext cx="8324156" cy="507710"/>
+          </a:xfrm>
+        </p:spPr>
+        <p:txBody>
+          <a:bodyPr>
+            <a:noAutofit/>
+          </a:bodyPr>
+          <a:lstStyle/>
+          <a:p>
+            <a:r>
+              <a:rPr lang="en-US" sz="2400" dirty="0"/>
+              <a:t>Model simulations: self curing viral load dynamics</a:t>
+            </a:r>
+            <a:endParaRPr lang="ru-RU" sz="2400" dirty="0"/>
+          </a:p>
+        </p:txBody>
+      </p:sp>
+      <p:sp>
+        <p:nvSpPr>
+          <p:cNvPr id="3" name="Slide Number Placeholder 2">
+            <a:extLst>
+              <a:ext uri="{FF2B5EF4-FFF2-40B4-BE49-F238E27FC236}">
+                <a16:creationId xmlns:a16="http://schemas.microsoft.com/office/drawing/2014/main" id="{B024B872-507A-4C79-B75E-90137F5363F8}"/>
+              </a:ext>
+            </a:extLst>
+          </p:cNvPr>
+          <p:cNvSpPr>
+            <a:spLocks noGrp="1"/>
+          </p:cNvSpPr>
+          <p:nvPr>
+            <p:ph type="sldNum" sz="quarter" idx="12"/>
+          </p:nvPr>
+        </p:nvSpPr>
+        <p:spPr/>
+        <p:txBody>
+          <a:bodyPr/>
+          <a:lstStyle/>
+          <a:p>
+            <a:fld id="{8D0E1ED9-1B5C-4060-9004-48CB920062D4}" type="slidenum">
+              <a:rPr lang="ru-RU" smtClean="0"/>
+              <a:pPr/>
+              <a:t>26</a:t>
+            </a:fld>
+            <a:endParaRPr lang="ru-RU"/>
+          </a:p>
+        </p:txBody>
+      </p:sp>
+      <p:sp>
+        <p:nvSpPr>
+          <p:cNvPr id="39" name="TextBox 38">
+            <a:extLst>
+              <a:ext uri="{FF2B5EF4-FFF2-40B4-BE49-F238E27FC236}">
+                <a16:creationId xmlns:a16="http://schemas.microsoft.com/office/drawing/2014/main" id="{8D7D1452-A17A-4E27-ADEF-6EEEECF28192}"/>
+              </a:ext>
+            </a:extLst>
+          </p:cNvPr>
+          <p:cNvSpPr txBox="1"/>
+          <p:nvPr/>
+        </p:nvSpPr>
+        <p:spPr>
+          <a:xfrm>
+            <a:off x="65313" y="2953946"/>
+            <a:ext cx="3738175" cy="3847207"/>
+          </a:xfrm>
+          <a:prstGeom prst="rect">
+            <a:avLst/>
+          </a:prstGeom>
+          <a:solidFill>
+            <a:schemeClr val="bg1"/>
+          </a:solidFill>
+        </p:spPr>
+        <p:txBody>
+          <a:bodyPr wrap="square" rtlCol="0">
+            <a:spAutoFit/>
+          </a:bodyPr>
+          <a:lstStyle/>
+          <a:p>
+            <a:r>
+              <a:rPr lang="en-US" sz="2000" dirty="0">
+                <a:latin typeface="+mj-lt"/>
+              </a:rPr>
+              <a:t>RESULTS: </a:t>
+            </a:r>
+          </a:p>
+          <a:p>
+            <a:pPr marL="285750" indent="-285750">
+              <a:buFont typeface="Arial" panose="020B0604020202020204" pitchFamily="34" charset="0"/>
+              <a:buChar char="•"/>
+            </a:pPr>
+            <a:r>
+              <a:rPr lang="en-US" sz="1600" dirty="0"/>
+              <a:t>ODE system has 1 unstable and 2 stable steady states. One of the stable steady states correspond to 0 viral load and other corresponds to very substantial viral load. </a:t>
+            </a:r>
+          </a:p>
+          <a:p>
+            <a:pPr marL="285750" indent="-285750">
+              <a:buFont typeface="Arial" panose="020B0604020202020204" pitchFamily="34" charset="0"/>
+              <a:buChar char="•"/>
+            </a:pPr>
+            <a:endParaRPr lang="en-US" sz="1600" dirty="0"/>
+          </a:p>
+          <a:p>
+            <a:pPr marL="285750" indent="-285750">
+              <a:buFont typeface="Arial" panose="020B0604020202020204" pitchFamily="34" charset="0"/>
+              <a:buChar char="•"/>
+            </a:pPr>
+            <a:r>
+              <a:rPr lang="en-US" sz="1600" dirty="0"/>
+              <a:t>Model is able to describes self curing dynamics, i.e., viral load tends to 0 when initial virus concentration is below threshold. If initial virus concentration is above threshold then virtual patient is being infected and viral load tends to very high value with time. </a:t>
+            </a:r>
+            <a:endParaRPr lang="ru-RU" sz="1600" dirty="0"/>
+          </a:p>
+        </p:txBody>
+      </p:sp>
+      <p:pic>
+        <p:nvPicPr>
+          <p:cNvPr id="7" name="Picture 6">
+            <a:extLst>
+              <a:ext uri="{FF2B5EF4-FFF2-40B4-BE49-F238E27FC236}">
+                <a16:creationId xmlns:a16="http://schemas.microsoft.com/office/drawing/2014/main" id="{DB3434B7-9AAB-4C7A-8600-E0922813F051}"/>
+              </a:ext>
+            </a:extLst>
+          </p:cNvPr>
+          <p:cNvPicPr>
+            <a:picLocks noChangeAspect="1"/>
+          </p:cNvPicPr>
+          <p:nvPr/>
+        </p:nvPicPr>
+        <p:blipFill>
+          <a:blip r:embed="rId2"/>
+          <a:stretch>
+            <a:fillRect/>
+          </a:stretch>
+        </p:blipFill>
+        <p:spPr>
+          <a:xfrm>
+            <a:off x="3812820" y="3586829"/>
+            <a:ext cx="5340511" cy="3107206"/>
+          </a:xfrm>
+          <a:prstGeom prst="rect">
+            <a:avLst/>
+          </a:prstGeom>
+        </p:spPr>
+      </p:pic>
+      <p:pic>
+        <p:nvPicPr>
+          <p:cNvPr id="4" name="Picture 3">
+            <a:extLst>
+              <a:ext uri="{FF2B5EF4-FFF2-40B4-BE49-F238E27FC236}">
+                <a16:creationId xmlns:a16="http://schemas.microsoft.com/office/drawing/2014/main" id="{C6D6E8B0-D3A3-4D7B-B4F4-AFB0B72656D4}"/>
+              </a:ext>
+            </a:extLst>
+          </p:cNvPr>
+          <p:cNvPicPr>
+            <a:picLocks noChangeAspect="1"/>
+          </p:cNvPicPr>
+          <p:nvPr/>
+        </p:nvPicPr>
+        <p:blipFill>
+          <a:blip r:embed="rId3"/>
+          <a:stretch>
+            <a:fillRect/>
+          </a:stretch>
+        </p:blipFill>
+        <p:spPr>
+          <a:xfrm>
+            <a:off x="3803489" y="566144"/>
+            <a:ext cx="5340511" cy="2837390"/>
+          </a:xfrm>
+          <a:prstGeom prst="rect">
+            <a:avLst/>
+          </a:prstGeom>
+        </p:spPr>
+      </p:pic>
+      <p:pic>
+        <p:nvPicPr>
+          <p:cNvPr id="6" name="Picture 5">
+            <a:extLst>
+              <a:ext uri="{FF2B5EF4-FFF2-40B4-BE49-F238E27FC236}">
+                <a16:creationId xmlns:a16="http://schemas.microsoft.com/office/drawing/2014/main" id="{01EFA586-346E-4B60-B071-3E19E57FE2D1}"/>
+              </a:ext>
+            </a:extLst>
+          </p:cNvPr>
+          <p:cNvPicPr>
+            <a:picLocks noChangeAspect="1"/>
+          </p:cNvPicPr>
+          <p:nvPr/>
+        </p:nvPicPr>
+        <p:blipFill>
+          <a:blip r:embed="rId4"/>
+          <a:stretch>
+            <a:fillRect/>
+          </a:stretch>
+        </p:blipFill>
+        <p:spPr>
+          <a:xfrm>
+            <a:off x="0" y="566144"/>
+            <a:ext cx="3803489" cy="2215723"/>
+          </a:xfrm>
+          <a:prstGeom prst="rect">
+            <a:avLst/>
+          </a:prstGeom>
+        </p:spPr>
+      </p:pic>
+      <p:sp>
+        <p:nvSpPr>
+          <p:cNvPr id="8" name="TextBox 7">
+            <a:extLst>
+              <a:ext uri="{FF2B5EF4-FFF2-40B4-BE49-F238E27FC236}">
+                <a16:creationId xmlns:a16="http://schemas.microsoft.com/office/drawing/2014/main" id="{D207B163-DBC1-4F56-8CC3-09DA688C5034}"/>
+              </a:ext>
+            </a:extLst>
+          </p:cNvPr>
+          <p:cNvSpPr txBox="1"/>
+          <p:nvPr/>
+        </p:nvSpPr>
+        <p:spPr>
+          <a:xfrm>
+            <a:off x="4599993" y="3509996"/>
+            <a:ext cx="4159024" cy="369332"/>
+          </a:xfrm>
+          <a:prstGeom prst="rect">
+            <a:avLst/>
+          </a:prstGeom>
+          <a:noFill/>
+        </p:spPr>
+        <p:txBody>
+          <a:bodyPr wrap="none" rtlCol="0">
+            <a:spAutoFit/>
+          </a:bodyPr>
+          <a:lstStyle/>
+          <a:p>
+            <a:r>
+              <a:rPr lang="en-US" dirty="0">
+                <a:latin typeface="+mj-lt"/>
+              </a:rPr>
+              <a:t>Viral load dynamics w/o IR induction</a:t>
+            </a:r>
+            <a:endParaRPr lang="ru-RU" dirty="0">
+              <a:latin typeface="+mj-lt"/>
+            </a:endParaRPr>
+          </a:p>
+        </p:txBody>
+      </p:sp>
+      <p:sp>
+        <p:nvSpPr>
+          <p:cNvPr id="12" name="TextBox 11">
+            <a:extLst>
+              <a:ext uri="{FF2B5EF4-FFF2-40B4-BE49-F238E27FC236}">
+                <a16:creationId xmlns:a16="http://schemas.microsoft.com/office/drawing/2014/main" id="{54B85EB7-CACA-4388-9017-377E7ABB932B}"/>
+              </a:ext>
+            </a:extLst>
+          </p:cNvPr>
+          <p:cNvSpPr txBox="1"/>
+          <p:nvPr/>
+        </p:nvSpPr>
+        <p:spPr>
+          <a:xfrm>
+            <a:off x="4593772" y="517976"/>
+            <a:ext cx="4212692" cy="369332"/>
+          </a:xfrm>
+          <a:prstGeom prst="rect">
+            <a:avLst/>
+          </a:prstGeom>
+          <a:noFill/>
+        </p:spPr>
+        <p:txBody>
+          <a:bodyPr wrap="none" rtlCol="0">
+            <a:spAutoFit/>
+          </a:bodyPr>
+          <a:lstStyle/>
+          <a:p>
+            <a:r>
+              <a:rPr lang="en-US" dirty="0">
+                <a:latin typeface="+mj-lt"/>
+              </a:rPr>
+              <a:t>Viral load dynamics with IR induction</a:t>
+            </a:r>
+            <a:endParaRPr lang="ru-RU" dirty="0">
+              <a:latin typeface="+mj-lt"/>
+            </a:endParaRPr>
+          </a:p>
+        </p:txBody>
+      </p:sp>
+      <p:sp>
+        <p:nvSpPr>
+          <p:cNvPr id="9" name="TextBox 8">
+            <a:extLst>
+              <a:ext uri="{FF2B5EF4-FFF2-40B4-BE49-F238E27FC236}">
+                <a16:creationId xmlns:a16="http://schemas.microsoft.com/office/drawing/2014/main" id="{1B3F9064-BD72-47A5-8E6B-1D27CA0CA27B}"/>
+              </a:ext>
+            </a:extLst>
+          </p:cNvPr>
+          <p:cNvSpPr txBox="1"/>
+          <p:nvPr/>
+        </p:nvSpPr>
+        <p:spPr>
+          <a:xfrm>
+            <a:off x="7456414" y="5337110"/>
+            <a:ext cx="1612942" cy="276999"/>
+          </a:xfrm>
+          <a:prstGeom prst="rect">
+            <a:avLst/>
+          </a:prstGeom>
+          <a:noFill/>
+        </p:spPr>
+        <p:txBody>
+          <a:bodyPr wrap="none" rtlCol="0">
+            <a:spAutoFit/>
+          </a:bodyPr>
+          <a:lstStyle/>
+          <a:p>
+            <a:r>
+              <a:rPr lang="en-US" sz="1200" dirty="0">
+                <a:highlight>
+                  <a:srgbClr val="00FF00"/>
+                </a:highlight>
+              </a:rPr>
+              <a:t>self curing dynamics</a:t>
+            </a:r>
+            <a:endParaRPr lang="ru-RU" sz="1200" dirty="0">
+              <a:highlight>
+                <a:srgbClr val="00FF00"/>
+              </a:highlight>
+            </a:endParaRPr>
+          </a:p>
+        </p:txBody>
+      </p:sp>
+      <p:sp>
+        <p:nvSpPr>
+          <p:cNvPr id="14" name="TextBox 13">
+            <a:extLst>
+              <a:ext uri="{FF2B5EF4-FFF2-40B4-BE49-F238E27FC236}">
+                <a16:creationId xmlns:a16="http://schemas.microsoft.com/office/drawing/2014/main" id="{D82C5532-E2D5-48E0-AA53-02C5CCA137E2}"/>
+              </a:ext>
+            </a:extLst>
+          </p:cNvPr>
+          <p:cNvSpPr txBox="1"/>
+          <p:nvPr/>
+        </p:nvSpPr>
+        <p:spPr>
+          <a:xfrm>
+            <a:off x="5192186" y="4033933"/>
+            <a:ext cx="799642" cy="276999"/>
+          </a:xfrm>
+          <a:prstGeom prst="rect">
+            <a:avLst/>
+          </a:prstGeom>
+          <a:noFill/>
+        </p:spPr>
+        <p:txBody>
+          <a:bodyPr wrap="none" rtlCol="0">
+            <a:spAutoFit/>
+          </a:bodyPr>
+          <a:lstStyle/>
+          <a:p>
+            <a:r>
+              <a:rPr lang="en-US" sz="1200" dirty="0">
+                <a:highlight>
+                  <a:srgbClr val="FF0000"/>
+                </a:highlight>
+              </a:rPr>
+              <a:t>infection</a:t>
+            </a:r>
+            <a:endParaRPr lang="ru-RU" sz="1200" dirty="0">
+              <a:highlight>
+                <a:srgbClr val="FF0000"/>
+              </a:highlight>
+            </a:endParaRPr>
+          </a:p>
+        </p:txBody>
+      </p:sp>
+    </p:spTree>
+    <p:extLst>
+      <p:ext uri="{BB962C8B-B14F-4D97-AF65-F5344CB8AC3E}">
+        <p14:creationId xmlns:p14="http://schemas.microsoft.com/office/powerpoint/2010/main" val="4172162186"/>
       </p:ext>
     </p:extLst>
   </p:cSld>

</xml_diff>